<commit_message>
Updating next meeting slides -- add slide from Lucid to show what I am not interested in doing
</commit_message>
<xml_diff>
--- a/Presentations/Supervisor Meetings/2024/202404XX.pptx
+++ b/Presentations/Supervisor Meetings/2024/202404XX.pptx
@@ -5,15 +5,16 @@
     <p:sldMasterId id="2147483884" r:id="rId1"/>
   </p:sldMasterIdLst>
   <p:notesMasterIdLst>
-    <p:notesMasterId r:id="rId8"/>
+    <p:notesMasterId r:id="rId9"/>
   </p:notesMasterIdLst>
   <p:sldIdLst>
     <p:sldId id="256" r:id="rId2"/>
     <p:sldId id="257" r:id="rId3"/>
     <p:sldId id="262" r:id="rId4"/>
-    <p:sldId id="263" r:id="rId5"/>
-    <p:sldId id="264" r:id="rId6"/>
-    <p:sldId id="265" r:id="rId7"/>
+    <p:sldId id="266" r:id="rId5"/>
+    <p:sldId id="263" r:id="rId6"/>
+    <p:sldId id="264" r:id="rId7"/>
+    <p:sldId id="265" r:id="rId8"/>
   </p:sldIdLst>
   <p:sldSz cx="12192000" cy="6858000"/>
   <p:notesSz cx="6858000" cy="9144000"/>
@@ -123,7 +124,7 @@
 <file path=ppt/revisionInfo.xml><?xml version="1.0" encoding="utf-8"?>
 <p1510:revInfo xmlns:a="http://schemas.openxmlformats.org/drawingml/2006/main" xmlns:r="http://schemas.openxmlformats.org/officeDocument/2006/relationships" xmlns:p1510="http://schemas.microsoft.com/office/powerpoint/2015/10/main">
   <p1510:revLst>
-    <p1510:client id="{A00DBCA1-E1BD-4C02-BB36-528815D88A8B}" v="5" dt="2024-04-14T21:25:39.639"/>
+    <p1510:client id="{A00DBCA1-E1BD-4C02-BB36-528815D88A8B}" v="8" dt="2024-04-17T15:09:56.997"/>
   </p1510:revLst>
 </p1510:revInfo>
 </file>
@@ -3323,8 +3324,8 @@
   </pc:docChgLst>
   <pc:docChgLst>
     <pc:chgData name="Sean O Fithcheallaigh" userId="47659c31-a575-4792-8be3-61268c4ee0d6" providerId="ADAL" clId="{A00DBCA1-E1BD-4C02-BB36-528815D88A8B}"/>
-    <pc:docChg chg="undo custSel modSld">
-      <pc:chgData name="Sean O Fithcheallaigh" userId="47659c31-a575-4792-8be3-61268c4ee0d6" providerId="ADAL" clId="{A00DBCA1-E1BD-4C02-BB36-528815D88A8B}" dt="2024-04-14T21:25:44.380" v="48" actId="478"/>
+    <pc:docChg chg="undo custSel addSld delSld modSld">
+      <pc:chgData name="Sean O Fithcheallaigh" userId="47659c31-a575-4792-8be3-61268c4ee0d6" providerId="ADAL" clId="{A00DBCA1-E1BD-4C02-BB36-528815D88A8B}" dt="2024-04-17T15:15:16.346" v="138" actId="27636"/>
       <pc:docMkLst>
         <pc:docMk/>
       </pc:docMkLst>
@@ -3344,7 +3345,7 @@
         </pc:spChg>
       </pc:sldChg>
       <pc:sldChg chg="addSp delSp modSp mod">
-        <pc:chgData name="Sean O Fithcheallaigh" userId="47659c31-a575-4792-8be3-61268c4ee0d6" providerId="ADAL" clId="{A00DBCA1-E1BD-4C02-BB36-528815D88A8B}" dt="2024-04-14T21:25:44.380" v="48" actId="478"/>
+        <pc:chgData name="Sean O Fithcheallaigh" userId="47659c31-a575-4792-8be3-61268c4ee0d6" providerId="ADAL" clId="{A00DBCA1-E1BD-4C02-BB36-528815D88A8B}" dt="2024-04-17T15:11:55.526" v="107" actId="478"/>
         <pc:sldMkLst>
           <pc:docMk/>
           <pc:sldMk cId="2974212779" sldId="262"/>
@@ -3358,23 +3359,23 @@
           </ac:spMkLst>
         </pc:spChg>
         <pc:picChg chg="add del mod">
-          <ac:chgData name="Sean O Fithcheallaigh" userId="47659c31-a575-4792-8be3-61268c4ee0d6" providerId="ADAL" clId="{A00DBCA1-E1BD-4C02-BB36-528815D88A8B}" dt="2024-04-14T21:23:53.991" v="42" actId="1076"/>
+          <ac:chgData name="Sean O Fithcheallaigh" userId="47659c31-a575-4792-8be3-61268c4ee0d6" providerId="ADAL" clId="{A00DBCA1-E1BD-4C02-BB36-528815D88A8B}" dt="2024-04-17T15:05:39.852" v="49" actId="478"/>
           <ac:picMkLst>
             <pc:docMk/>
             <pc:sldMk cId="2974212779" sldId="262"/>
             <ac:picMk id="4" creationId="{086D59DF-0456-FC6F-0345-767FA9D03A73}"/>
           </ac:picMkLst>
         </pc:picChg>
-        <pc:picChg chg="add mod">
-          <ac:chgData name="Sean O Fithcheallaigh" userId="47659c31-a575-4792-8be3-61268c4ee0d6" providerId="ADAL" clId="{A00DBCA1-E1BD-4C02-BB36-528815D88A8B}" dt="2024-04-14T21:23:42.746" v="39" actId="1076"/>
+        <pc:picChg chg="add del mod">
+          <ac:chgData name="Sean O Fithcheallaigh" userId="47659c31-a575-4792-8be3-61268c4ee0d6" providerId="ADAL" clId="{A00DBCA1-E1BD-4C02-BB36-528815D88A8B}" dt="2024-04-17T15:05:42.698" v="51" actId="478"/>
           <ac:picMkLst>
             <pc:docMk/>
             <pc:sldMk cId="2974212779" sldId="262"/>
             <ac:picMk id="7" creationId="{F2205E00-7896-8587-4F60-F55F05200972}"/>
           </ac:picMkLst>
         </pc:picChg>
-        <pc:picChg chg="add mod">
-          <ac:chgData name="Sean O Fithcheallaigh" userId="47659c31-a575-4792-8be3-61268c4ee0d6" providerId="ADAL" clId="{A00DBCA1-E1BD-4C02-BB36-528815D88A8B}" dt="2024-04-14T21:23:34.312" v="38"/>
+        <pc:picChg chg="add del mod">
+          <ac:chgData name="Sean O Fithcheallaigh" userId="47659c31-a575-4792-8be3-61268c4ee0d6" providerId="ADAL" clId="{A00DBCA1-E1BD-4C02-BB36-528815D88A8B}" dt="2024-04-17T15:05:43.949" v="52" actId="478"/>
           <ac:picMkLst>
             <pc:docMk/>
             <pc:sldMk cId="2974212779" sldId="262"/>
@@ -3389,12 +3390,146 @@
             <ac:picMk id="10" creationId="{D4815610-1E76-5291-4171-97C2B36E3683}"/>
           </ac:picMkLst>
         </pc:picChg>
-        <pc:picChg chg="add mod">
-          <ac:chgData name="Sean O Fithcheallaigh" userId="47659c31-a575-4792-8be3-61268c4ee0d6" providerId="ADAL" clId="{A00DBCA1-E1BD-4C02-BB36-528815D88A8B}" dt="2024-04-14T21:25:42.080" v="47" actId="1076"/>
+        <pc:picChg chg="add del mod">
+          <ac:chgData name="Sean O Fithcheallaigh" userId="47659c31-a575-4792-8be3-61268c4ee0d6" providerId="ADAL" clId="{A00DBCA1-E1BD-4C02-BB36-528815D88A8B}" dt="2024-04-17T15:05:41.481" v="50" actId="478"/>
           <ac:picMkLst>
             <pc:docMk/>
             <pc:sldMk cId="2974212779" sldId="262"/>
             <ac:picMk id="11" creationId="{F015675B-1023-3C37-D769-09667DA1FF63}"/>
+          </ac:picMkLst>
+        </pc:picChg>
+        <pc:picChg chg="mod">
+          <ac:chgData name="Sean O Fithcheallaigh" userId="47659c31-a575-4792-8be3-61268c4ee0d6" providerId="ADAL" clId="{A00DBCA1-E1BD-4C02-BB36-528815D88A8B}" dt="2024-04-17T15:09:17.861" v="72" actId="1076"/>
+          <ac:picMkLst>
+            <pc:docMk/>
+            <pc:sldMk cId="2974212779" sldId="262"/>
+            <ac:picMk id="28" creationId="{CB2F3A77-3849-DA56-7FB0-BCA1ACFE8801}"/>
+          </ac:picMkLst>
+        </pc:picChg>
+        <pc:cxnChg chg="add del">
+          <ac:chgData name="Sean O Fithcheallaigh" userId="47659c31-a575-4792-8be3-61268c4ee0d6" providerId="ADAL" clId="{A00DBCA1-E1BD-4C02-BB36-528815D88A8B}" dt="2024-04-17T15:11:50.825" v="104" actId="478"/>
+          <ac:cxnSpMkLst>
+            <pc:docMk/>
+            <pc:sldMk cId="2974212779" sldId="262"/>
+            <ac:cxnSpMk id="6" creationId="{B25F3BD7-3E12-A818-D951-ADEC84351BDA}"/>
+          </ac:cxnSpMkLst>
+        </pc:cxnChg>
+        <pc:cxnChg chg="add del">
+          <ac:chgData name="Sean O Fithcheallaigh" userId="47659c31-a575-4792-8be3-61268c4ee0d6" providerId="ADAL" clId="{A00DBCA1-E1BD-4C02-BB36-528815D88A8B}" dt="2024-04-17T15:11:51.750" v="105" actId="478"/>
+          <ac:cxnSpMkLst>
+            <pc:docMk/>
+            <pc:sldMk cId="2974212779" sldId="262"/>
+            <ac:cxnSpMk id="12" creationId="{83EF70D2-40A7-E68A-ED5B-308F1786E83A}"/>
+          </ac:cxnSpMkLst>
+        </pc:cxnChg>
+        <pc:cxnChg chg="add del">
+          <ac:chgData name="Sean O Fithcheallaigh" userId="47659c31-a575-4792-8be3-61268c4ee0d6" providerId="ADAL" clId="{A00DBCA1-E1BD-4C02-BB36-528815D88A8B}" dt="2024-04-17T15:11:54.095" v="106" actId="478"/>
+          <ac:cxnSpMkLst>
+            <pc:docMk/>
+            <pc:sldMk cId="2974212779" sldId="262"/>
+            <ac:cxnSpMk id="14" creationId="{0681145B-0026-DB8F-5A05-C215D4DE73EE}"/>
+          </ac:cxnSpMkLst>
+        </pc:cxnChg>
+        <pc:cxnChg chg="add del mod">
+          <ac:chgData name="Sean O Fithcheallaigh" userId="47659c31-a575-4792-8be3-61268c4ee0d6" providerId="ADAL" clId="{A00DBCA1-E1BD-4C02-BB36-528815D88A8B}" dt="2024-04-17T15:11:55.526" v="107" actId="478"/>
+          <ac:cxnSpMkLst>
+            <pc:docMk/>
+            <pc:sldMk cId="2974212779" sldId="262"/>
+            <ac:cxnSpMk id="16" creationId="{8C3952DF-AAA3-C877-6DDC-9303EE1A2A73}"/>
+          </ac:cxnSpMkLst>
+        </pc:cxnChg>
+      </pc:sldChg>
+      <pc:sldChg chg="addSp delSp modSp add mod">
+        <pc:chgData name="Sean O Fithcheallaigh" userId="47659c31-a575-4792-8be3-61268c4ee0d6" providerId="ADAL" clId="{A00DBCA1-E1BD-4C02-BB36-528815D88A8B}" dt="2024-04-17T15:15:16.346" v="138" actId="27636"/>
+        <pc:sldMkLst>
+          <pc:docMk/>
+          <pc:sldMk cId="129023176" sldId="266"/>
+        </pc:sldMkLst>
+        <pc:spChg chg="mod">
+          <ac:chgData name="Sean O Fithcheallaigh" userId="47659c31-a575-4792-8be3-61268c4ee0d6" providerId="ADAL" clId="{A00DBCA1-E1BD-4C02-BB36-528815D88A8B}" dt="2024-04-17T15:15:16.346" v="138" actId="27636"/>
+          <ac:spMkLst>
+            <pc:docMk/>
+            <pc:sldMk cId="129023176" sldId="266"/>
+            <ac:spMk id="3" creationId="{6E0278D4-A37C-DE0F-37CD-F271C3D0E448}"/>
+          </ac:spMkLst>
+        </pc:spChg>
+        <pc:picChg chg="add mod ord modCrop">
+          <ac:chgData name="Sean O Fithcheallaigh" userId="47659c31-a575-4792-8be3-61268c4ee0d6" providerId="ADAL" clId="{A00DBCA1-E1BD-4C02-BB36-528815D88A8B}" dt="2024-04-17T15:11:35.227" v="99" actId="14100"/>
+          <ac:picMkLst>
+            <pc:docMk/>
+            <pc:sldMk cId="129023176" sldId="266"/>
+            <ac:picMk id="4" creationId="{98BF4B6C-A515-D4F3-6FD5-4A4E5C3F1965}"/>
+          </ac:picMkLst>
+        </pc:picChg>
+        <pc:picChg chg="del">
+          <ac:chgData name="Sean O Fithcheallaigh" userId="47659c31-a575-4792-8be3-61268c4ee0d6" providerId="ADAL" clId="{A00DBCA1-E1BD-4C02-BB36-528815D88A8B}" dt="2024-04-17T15:09:54.246" v="78" actId="478"/>
+          <ac:picMkLst>
+            <pc:docMk/>
+            <pc:sldMk cId="129023176" sldId="266"/>
+            <ac:picMk id="28" creationId="{CB2F3A77-3849-DA56-7FB0-BCA1ACFE8801}"/>
+          </ac:picMkLst>
+        </pc:picChg>
+        <pc:cxnChg chg="del mod">
+          <ac:chgData name="Sean O Fithcheallaigh" userId="47659c31-a575-4792-8be3-61268c4ee0d6" providerId="ADAL" clId="{A00DBCA1-E1BD-4C02-BB36-528815D88A8B}" dt="2024-04-17T15:11:44.386" v="100" actId="478"/>
+          <ac:cxnSpMkLst>
+            <pc:docMk/>
+            <pc:sldMk cId="129023176" sldId="266"/>
+            <ac:cxnSpMk id="6" creationId="{B25F3BD7-3E12-A818-D951-ADEC84351BDA}"/>
+          </ac:cxnSpMkLst>
+        </pc:cxnChg>
+        <pc:cxnChg chg="del">
+          <ac:chgData name="Sean O Fithcheallaigh" userId="47659c31-a575-4792-8be3-61268c4ee0d6" providerId="ADAL" clId="{A00DBCA1-E1BD-4C02-BB36-528815D88A8B}" dt="2024-04-17T15:11:47.862" v="103" actId="478"/>
+          <ac:cxnSpMkLst>
+            <pc:docMk/>
+            <pc:sldMk cId="129023176" sldId="266"/>
+            <ac:cxnSpMk id="12" creationId="{83EF70D2-40A7-E68A-ED5B-308F1786E83A}"/>
+          </ac:cxnSpMkLst>
+        </pc:cxnChg>
+        <pc:cxnChg chg="del">
+          <ac:chgData name="Sean O Fithcheallaigh" userId="47659c31-a575-4792-8be3-61268c4ee0d6" providerId="ADAL" clId="{A00DBCA1-E1BD-4C02-BB36-528815D88A8B}" dt="2024-04-17T15:11:46.592" v="102" actId="478"/>
+          <ac:cxnSpMkLst>
+            <pc:docMk/>
+            <pc:sldMk cId="129023176" sldId="266"/>
+            <ac:cxnSpMk id="14" creationId="{0681145B-0026-DB8F-5A05-C215D4DE73EE}"/>
+          </ac:cxnSpMkLst>
+        </pc:cxnChg>
+        <pc:cxnChg chg="del">
+          <ac:chgData name="Sean O Fithcheallaigh" userId="47659c31-a575-4792-8be3-61268c4ee0d6" providerId="ADAL" clId="{A00DBCA1-E1BD-4C02-BB36-528815D88A8B}" dt="2024-04-17T15:11:45.366" v="101" actId="478"/>
+          <ac:cxnSpMkLst>
+            <pc:docMk/>
+            <pc:sldMk cId="129023176" sldId="266"/>
+            <ac:cxnSpMk id="16" creationId="{8C3952DF-AAA3-C877-6DDC-9303EE1A2A73}"/>
+          </ac:cxnSpMkLst>
+        </pc:cxnChg>
+      </pc:sldChg>
+      <pc:sldChg chg="addSp delSp modSp add del mod">
+        <pc:chgData name="Sean O Fithcheallaigh" userId="47659c31-a575-4792-8be3-61268c4ee0d6" providerId="ADAL" clId="{A00DBCA1-E1BD-4C02-BB36-528815D88A8B}" dt="2024-04-17T15:08:58.384" v="70" actId="2696"/>
+        <pc:sldMkLst>
+          <pc:docMk/>
+          <pc:sldMk cId="2365521372" sldId="266"/>
+        </pc:sldMkLst>
+        <pc:picChg chg="add del mod">
+          <ac:chgData name="Sean O Fithcheallaigh" userId="47659c31-a575-4792-8be3-61268c4ee0d6" providerId="ADAL" clId="{A00DBCA1-E1BD-4C02-BB36-528815D88A8B}" dt="2024-04-17T15:08:14.706" v="61" actId="478"/>
+          <ac:picMkLst>
+            <pc:docMk/>
+            <pc:sldMk cId="2365521372" sldId="266"/>
+            <ac:picMk id="4" creationId="{D537A898-17A9-95C1-35DF-A43B61B898C5}"/>
+          </ac:picMkLst>
+        </pc:picChg>
+        <pc:picChg chg="add mod">
+          <ac:chgData name="Sean O Fithcheallaigh" userId="47659c31-a575-4792-8be3-61268c4ee0d6" providerId="ADAL" clId="{A00DBCA1-E1BD-4C02-BB36-528815D88A8B}" dt="2024-04-17T15:08:43.473" v="69" actId="1076"/>
+          <ac:picMkLst>
+            <pc:docMk/>
+            <pc:sldMk cId="2365521372" sldId="266"/>
+            <ac:picMk id="7" creationId="{4D0D7060-7053-8DC8-2046-FD2B9576928A}"/>
+          </ac:picMkLst>
+        </pc:picChg>
+        <pc:picChg chg="del">
+          <ac:chgData name="Sean O Fithcheallaigh" userId="47659c31-a575-4792-8be3-61268c4ee0d6" providerId="ADAL" clId="{A00DBCA1-E1BD-4C02-BB36-528815D88A8B}" dt="2024-04-17T15:05:51.910" v="54" actId="478"/>
+          <ac:picMkLst>
+            <pc:docMk/>
+            <pc:sldMk cId="2365521372" sldId="266"/>
+            <ac:picMk id="28" creationId="{CB2F3A77-3849-DA56-7FB0-BCA1ACFE8801}"/>
           </ac:picMkLst>
         </pc:picChg>
       </pc:sldChg>
@@ -4111,7 +4246,7 @@
           <a:p>
             <a:fld id="{E9A43392-C767-4137-A1B4-E9A9DDFBDAD0}" type="datetimeFigureOut">
               <a:rPr lang="en-GB" smtClean="0"/>
-              <a:t>14/04/2024</a:t>
+              <a:t>17/04/2024</a:t>
             </a:fld>
             <a:endParaRPr lang="en-GB"/>
           </a:p>
@@ -4607,7 +4742,7 @@
           <a:p>
             <a:fld id="{5B07C734-A788-4C44-A615-CFDCB507568B}" type="datetime1">
               <a:rPr lang="en-GB" smtClean="0"/>
-              <a:t>14/04/2024</a:t>
+              <a:t>17/04/2024</a:t>
             </a:fld>
             <a:endParaRPr lang="en-GB"/>
           </a:p>
@@ -4818,7 +4953,7 @@
           <a:p>
             <a:fld id="{BBCA379E-BDDE-43DA-BA17-E6B54240C0B3}" type="datetime1">
               <a:rPr lang="en-GB" smtClean="0"/>
-              <a:t>14/04/2024</a:t>
+              <a:t>17/04/2024</a:t>
             </a:fld>
             <a:endParaRPr lang="en-GB"/>
           </a:p>
@@ -5079,7 +5214,7 @@
           <a:p>
             <a:fld id="{133DCD2D-99F9-4E1C-9F3B-8D374F39343D}" type="datetime1">
               <a:rPr lang="en-GB" smtClean="0"/>
-              <a:t>14/04/2024</a:t>
+              <a:t>17/04/2024</a:t>
             </a:fld>
             <a:endParaRPr lang="en-GB"/>
           </a:p>
@@ -5268,7 +5403,7 @@
           <a:p>
             <a:fld id="{7778A1CA-0478-45A0-9435-D96032CA4164}" type="datetime1">
               <a:rPr lang="en-GB" smtClean="0"/>
-              <a:t>14/04/2024</a:t>
+              <a:t>17/04/2024</a:t>
             </a:fld>
             <a:endParaRPr lang="en-GB"/>
           </a:p>
@@ -5620,7 +5755,7 @@
           <a:p>
             <a:fld id="{23DC5470-1C1D-4923-B8A8-961DFF721FBD}" type="datetime1">
               <a:rPr lang="en-GB" smtClean="0"/>
-              <a:t>14/04/2024</a:t>
+              <a:t>17/04/2024</a:t>
             </a:fld>
             <a:endParaRPr lang="en-GB"/>
           </a:p>
@@ -5898,7 +6033,7 @@
           <a:p>
             <a:fld id="{0E741BE0-2C8A-4B1C-AFBF-7305842CD248}" type="datetime1">
               <a:rPr lang="en-GB" smtClean="0"/>
-              <a:t>14/04/2024</a:t>
+              <a:t>17/04/2024</a:t>
             </a:fld>
             <a:endParaRPr lang="en-GB"/>
           </a:p>
@@ -6280,7 +6415,7 @@
           <a:p>
             <a:fld id="{3D2519A9-BEC6-4C36-B98F-DA784E00FBFE}" type="datetime1">
               <a:rPr lang="en-GB" smtClean="0"/>
-              <a:t>14/04/2024</a:t>
+              <a:t>17/04/2024</a:t>
             </a:fld>
             <a:endParaRPr lang="en-GB"/>
           </a:p>
@@ -6401,7 +6536,7 @@
           <a:p>
             <a:fld id="{005527DF-4A67-459D-BBB9-9CF200764E01}" type="datetime1">
               <a:rPr lang="en-GB" smtClean="0"/>
-              <a:t>14/04/2024</a:t>
+              <a:t>17/04/2024</a:t>
             </a:fld>
             <a:endParaRPr lang="en-GB"/>
           </a:p>
@@ -6577,7 +6712,7 @@
           <a:p>
             <a:fld id="{AB815DF0-B384-4B57-B949-BD773032C594}" type="datetime1">
               <a:rPr lang="en-GB" smtClean="0"/>
-              <a:t>14/04/2024</a:t>
+              <a:t>17/04/2024</a:t>
             </a:fld>
             <a:endParaRPr lang="en-GB"/>
           </a:p>
@@ -6936,7 +7071,7 @@
           <a:p>
             <a:fld id="{9A7FC2E2-2BAF-4FF7-AB60-CB61E8F4481E}" type="datetime1">
               <a:rPr lang="en-GB" smtClean="0"/>
-              <a:t>14/04/2024</a:t>
+              <a:t>17/04/2024</a:t>
             </a:fld>
             <a:endParaRPr lang="en-GB"/>
           </a:p>
@@ -7318,7 +7453,7 @@
           <a:p>
             <a:fld id="{922F4F2B-4496-4E96-BB72-FCD2DDED5FAC}" type="datetime1">
               <a:rPr lang="en-GB" smtClean="0"/>
-              <a:t>14/04/2024</a:t>
+              <a:t>17/04/2024</a:t>
             </a:fld>
             <a:endParaRPr lang="en-GB"/>
           </a:p>
@@ -7613,7 +7748,7 @@
           <a:p>
             <a:fld id="{A27F2E53-74FD-4822-A803-F8740BFB7820}" type="datetime1">
               <a:rPr lang="en-GB" smtClean="0"/>
-              <a:t>14/04/2024</a:t>
+              <a:t>17/04/2024</a:t>
             </a:fld>
             <a:endParaRPr lang="en-GB"/>
           </a:p>
@@ -9342,164 +9477,8 @@
         </p:blipFill>
         <p:spPr>
           <a:xfrm>
-            <a:off x="451744" y="1400175"/>
+            <a:off x="469499" y="1400175"/>
             <a:ext cx="9086850" cy="4057650"/>
-          </a:xfrm>
-          <a:prstGeom prst="rect">
-            <a:avLst/>
-          </a:prstGeom>
-        </p:spPr>
-      </p:pic>
-      <p:pic>
-        <p:nvPicPr>
-          <p:cNvPr id="4" name="Graphic 3" descr="Close with solid fill">
-            <a:extLst>
-              <a:ext uri="{FF2B5EF4-FFF2-40B4-BE49-F238E27FC236}">
-                <a16:creationId xmlns:a16="http://schemas.microsoft.com/office/drawing/2014/main" id="{086D59DF-0456-FC6F-0345-767FA9D03A73}"/>
-              </a:ext>
-            </a:extLst>
-          </p:cNvPr>
-          <p:cNvPicPr>
-            <a:picLocks noChangeAspect="1"/>
-          </p:cNvPicPr>
-          <p:nvPr/>
-        </p:nvPicPr>
-        <p:blipFill>
-          <a:blip r:embed="rId3">
-            <a:extLst>
-              <a:ext uri="{28A0092B-C50C-407E-A947-70E740481C1C}">
-                <a14:useLocalDpi xmlns:a14="http://schemas.microsoft.com/office/drawing/2010/main" val="0"/>
-              </a:ext>
-              <a:ext uri="{96DAC541-7B7A-43D3-8B79-37D633B846F1}">
-                <asvg:svgBlip xmlns:asvg="http://schemas.microsoft.com/office/drawing/2016/SVG/main" r:embed="rId4"/>
-              </a:ext>
-            </a:extLst>
-          </a:blip>
-          <a:stretch>
-            <a:fillRect/>
-          </a:stretch>
-        </p:blipFill>
-        <p:spPr>
-          <a:xfrm>
-            <a:off x="2928615" y="4336739"/>
-            <a:ext cx="596392" cy="439447"/>
-          </a:xfrm>
-          <a:prstGeom prst="rect">
-            <a:avLst/>
-          </a:prstGeom>
-        </p:spPr>
-      </p:pic>
-      <p:pic>
-        <p:nvPicPr>
-          <p:cNvPr id="7" name="Graphic 6" descr="Close with solid fill">
-            <a:extLst>
-              <a:ext uri="{FF2B5EF4-FFF2-40B4-BE49-F238E27FC236}">
-                <a16:creationId xmlns:a16="http://schemas.microsoft.com/office/drawing/2014/main" id="{F2205E00-7896-8587-4F60-F55F05200972}"/>
-              </a:ext>
-            </a:extLst>
-          </p:cNvPr>
-          <p:cNvPicPr>
-            <a:picLocks noChangeAspect="1"/>
-          </p:cNvPicPr>
-          <p:nvPr/>
-        </p:nvPicPr>
-        <p:blipFill>
-          <a:blip r:embed="rId3">
-            <a:extLst>
-              <a:ext uri="{28A0092B-C50C-407E-A947-70E740481C1C}">
-                <a14:useLocalDpi xmlns:a14="http://schemas.microsoft.com/office/drawing/2010/main" val="0"/>
-              </a:ext>
-              <a:ext uri="{96DAC541-7B7A-43D3-8B79-37D633B846F1}">
-                <asvg:svgBlip xmlns:asvg="http://schemas.microsoft.com/office/drawing/2016/SVG/main" r:embed="rId4"/>
-              </a:ext>
-            </a:extLst>
-          </a:blip>
-          <a:stretch>
-            <a:fillRect/>
-          </a:stretch>
-        </p:blipFill>
-        <p:spPr>
-          <a:xfrm>
-            <a:off x="9133534" y="3017370"/>
-            <a:ext cx="596392" cy="439447"/>
-          </a:xfrm>
-          <a:prstGeom prst="rect">
-            <a:avLst/>
-          </a:prstGeom>
-        </p:spPr>
-      </p:pic>
-      <p:pic>
-        <p:nvPicPr>
-          <p:cNvPr id="8" name="Graphic 7" descr="Close with solid fill">
-            <a:extLst>
-              <a:ext uri="{FF2B5EF4-FFF2-40B4-BE49-F238E27FC236}">
-                <a16:creationId xmlns:a16="http://schemas.microsoft.com/office/drawing/2014/main" id="{1909F26B-3CB5-CF36-51B8-F837A15396D6}"/>
-              </a:ext>
-            </a:extLst>
-          </p:cNvPr>
-          <p:cNvPicPr>
-            <a:picLocks noChangeAspect="1"/>
-          </p:cNvPicPr>
-          <p:nvPr/>
-        </p:nvPicPr>
-        <p:blipFill>
-          <a:blip r:embed="rId3">
-            <a:extLst>
-              <a:ext uri="{28A0092B-C50C-407E-A947-70E740481C1C}">
-                <a14:useLocalDpi xmlns:a14="http://schemas.microsoft.com/office/drawing/2010/main" val="0"/>
-              </a:ext>
-              <a:ext uri="{96DAC541-7B7A-43D3-8B79-37D633B846F1}">
-                <asvg:svgBlip xmlns:asvg="http://schemas.microsoft.com/office/drawing/2016/SVG/main" r:embed="rId4"/>
-              </a:ext>
-            </a:extLst>
-          </a:blip>
-          <a:stretch>
-            <a:fillRect/>
-          </a:stretch>
-        </p:blipFill>
-        <p:spPr>
-          <a:xfrm>
-            <a:off x="10111557" y="5971514"/>
-            <a:ext cx="596392" cy="439447"/>
-          </a:xfrm>
-          <a:prstGeom prst="rect">
-            <a:avLst/>
-          </a:prstGeom>
-        </p:spPr>
-      </p:pic>
-      <p:pic>
-        <p:nvPicPr>
-          <p:cNvPr id="11" name="Graphic 10" descr="Close with solid fill">
-            <a:extLst>
-              <a:ext uri="{FF2B5EF4-FFF2-40B4-BE49-F238E27FC236}">
-                <a16:creationId xmlns:a16="http://schemas.microsoft.com/office/drawing/2014/main" id="{F015675B-1023-3C37-D769-09667DA1FF63}"/>
-              </a:ext>
-            </a:extLst>
-          </p:cNvPr>
-          <p:cNvPicPr>
-            <a:picLocks noChangeAspect="1"/>
-          </p:cNvPicPr>
-          <p:nvPr/>
-        </p:nvPicPr>
-        <p:blipFill>
-          <a:blip r:embed="rId3">
-            <a:extLst>
-              <a:ext uri="{28A0092B-C50C-407E-A947-70E740481C1C}">
-                <a14:useLocalDpi xmlns:a14="http://schemas.microsoft.com/office/drawing/2010/main" val="0"/>
-              </a:ext>
-              <a:ext uri="{96DAC541-7B7A-43D3-8B79-37D633B846F1}">
-                <asvg:svgBlip xmlns:asvg="http://schemas.microsoft.com/office/drawing/2016/SVG/main" r:embed="rId4"/>
-              </a:ext>
-            </a:extLst>
-          </a:blip>
-          <a:stretch>
-            <a:fillRect/>
-          </a:stretch>
-        </p:blipFill>
-        <p:spPr>
-          <a:xfrm>
-            <a:off x="6250279" y="4935976"/>
-            <a:ext cx="596392" cy="439447"/>
           </a:xfrm>
           <a:prstGeom prst="rect">
             <a:avLst/>
@@ -9536,6 +9515,518 @@
           <a:chExt cx="0" cy="0"/>
         </a:xfrm>
       </p:grpSpPr>
+      <p:pic>
+        <p:nvPicPr>
+          <p:cNvPr id="4" name="Picture 3" descr="A screenshot of a computer&#10;&#10;Description automatically generated">
+            <a:extLst>
+              <a:ext uri="{FF2B5EF4-FFF2-40B4-BE49-F238E27FC236}">
+                <a16:creationId xmlns:a16="http://schemas.microsoft.com/office/drawing/2014/main" id="{98BF4B6C-A515-D4F3-6FD5-4A4E5C3F1965}"/>
+              </a:ext>
+            </a:extLst>
+          </p:cNvPr>
+          <p:cNvPicPr>
+            <a:picLocks noChangeAspect="1"/>
+          </p:cNvPicPr>
+          <p:nvPr/>
+        </p:nvPicPr>
+        <p:blipFill rotWithShape="1">
+          <a:blip r:embed="rId2">
+            <a:extLst>
+              <a:ext uri="{28A0092B-C50C-407E-A947-70E740481C1C}">
+                <a14:useLocalDpi xmlns:a14="http://schemas.microsoft.com/office/drawing/2010/main" val="0"/>
+              </a:ext>
+            </a:extLst>
+          </a:blip>
+          <a:srcRect l="476" t="2304" r="1726"/>
+          <a:stretch/>
+        </p:blipFill>
+        <p:spPr>
+          <a:xfrm>
+            <a:off x="471145" y="1433866"/>
+            <a:ext cx="8930307" cy="4109683"/>
+          </a:xfrm>
+          <a:prstGeom prst="rect">
+            <a:avLst/>
+          </a:prstGeom>
+        </p:spPr>
+      </p:pic>
+      <p:sp>
+        <p:nvSpPr>
+          <p:cNvPr id="3" name="Title 1">
+            <a:extLst>
+              <a:ext uri="{FF2B5EF4-FFF2-40B4-BE49-F238E27FC236}">
+                <a16:creationId xmlns:a16="http://schemas.microsoft.com/office/drawing/2014/main" id="{6E0278D4-A37C-DE0F-37CD-F271C3D0E448}"/>
+              </a:ext>
+            </a:extLst>
+          </p:cNvPr>
+          <p:cNvSpPr txBox="1">
+            <a:spLocks/>
+          </p:cNvSpPr>
+          <p:nvPr/>
+        </p:nvSpPr>
+        <p:spPr>
+          <a:xfrm>
+            <a:off x="1162975" y="329312"/>
+            <a:ext cx="9898602" cy="719427"/>
+          </a:xfrm>
+          <a:prstGeom prst="rect">
+            <a:avLst/>
+          </a:prstGeom>
+        </p:spPr>
+        <p:txBody>
+          <a:bodyPr vert="horz" lIns="91440" tIns="45720" rIns="91440" bIns="45720" rtlCol="0" anchor="b">
+            <a:normAutofit fontScale="90000"/>
+          </a:bodyPr>
+          <a:lstStyle>
+            <a:lvl1pPr algn="l" defTabSz="914400" rtl="0" eaLnBrk="1" latinLnBrk="0" hangingPunct="1">
+              <a:lnSpc>
+                <a:spcPct val="85000"/>
+              </a:lnSpc>
+              <a:spcBef>
+                <a:spcPct val="0"/>
+              </a:spcBef>
+              <a:buNone/>
+              <a:defRPr sz="4800" kern="1200" spc="-50" baseline="0">
+                <a:solidFill>
+                  <a:schemeClr val="tx1">
+                    <a:lumMod val="75000"/>
+                    <a:lumOff val="25000"/>
+                  </a:schemeClr>
+                </a:solidFill>
+                <a:latin typeface="+mj-lt"/>
+                <a:ea typeface="+mj-ea"/>
+                <a:cs typeface="+mj-cs"/>
+              </a:defRPr>
+            </a:lvl1pPr>
+          </a:lstStyle>
+          <a:p>
+            <a:r>
+              <a:rPr lang="en-US" dirty="0"/>
+              <a:t>Exploring Challenges in FL – Removing Topics</a:t>
+            </a:r>
+            <a:endParaRPr lang="en-GB" dirty="0"/>
+          </a:p>
+        </p:txBody>
+      </p:sp>
+      <p:sp>
+        <p:nvSpPr>
+          <p:cNvPr id="25" name="Slide Number Placeholder 24">
+            <a:extLst>
+              <a:ext uri="{FF2B5EF4-FFF2-40B4-BE49-F238E27FC236}">
+                <a16:creationId xmlns:a16="http://schemas.microsoft.com/office/drawing/2014/main" id="{5D555122-A67E-973E-7070-74B19E51C0CA}"/>
+              </a:ext>
+            </a:extLst>
+          </p:cNvPr>
+          <p:cNvSpPr>
+            <a:spLocks noGrp="1"/>
+          </p:cNvSpPr>
+          <p:nvPr>
+            <p:ph type="sldNum" sz="quarter" idx="12"/>
+          </p:nvPr>
+        </p:nvSpPr>
+        <p:spPr/>
+        <p:txBody>
+          <a:bodyPr/>
+          <a:lstStyle/>
+          <a:p>
+            <a:fld id="{D3726DCB-FEA5-4222-BB45-1CC90DF962E6}" type="slidenum">
+              <a:rPr lang="en-GB" smtClean="0"/>
+              <a:t>4</a:t>
+            </a:fld>
+            <a:endParaRPr lang="en-GB"/>
+          </a:p>
+        </p:txBody>
+      </p:sp>
+      <p:sp>
+        <p:nvSpPr>
+          <p:cNvPr id="5" name="Rectangle: Rounded Corners 4">
+            <a:extLst>
+              <a:ext uri="{FF2B5EF4-FFF2-40B4-BE49-F238E27FC236}">
+                <a16:creationId xmlns:a16="http://schemas.microsoft.com/office/drawing/2014/main" id="{3311A326-65C2-427F-85D4-B23964CF3455}"/>
+              </a:ext>
+            </a:extLst>
+          </p:cNvPr>
+          <p:cNvSpPr/>
+          <p:nvPr/>
+        </p:nvSpPr>
+        <p:spPr>
+          <a:xfrm>
+            <a:off x="9623394" y="1802167"/>
+            <a:ext cx="1864311" cy="612559"/>
+          </a:xfrm>
+          <a:prstGeom prst="roundRect">
+            <a:avLst/>
+          </a:prstGeom>
+          <a:solidFill>
+            <a:schemeClr val="accent2"/>
+          </a:solidFill>
+        </p:spPr>
+        <p:style>
+          <a:lnRef idx="2">
+            <a:schemeClr val="accent1">
+              <a:shade val="15000"/>
+            </a:schemeClr>
+          </a:lnRef>
+          <a:fillRef idx="1">
+            <a:schemeClr val="accent1"/>
+          </a:fillRef>
+          <a:effectRef idx="0">
+            <a:schemeClr val="accent1"/>
+          </a:effectRef>
+          <a:fontRef idx="minor">
+            <a:schemeClr val="lt1"/>
+          </a:fontRef>
+        </p:style>
+        <p:txBody>
+          <a:bodyPr rtlCol="0" anchor="t">
+            <a:normAutofit fontScale="62500" lnSpcReduction="20000"/>
+          </a:bodyPr>
+          <a:lstStyle/>
+          <a:p>
+            <a:pPr algn="ctr"/>
+            <a:r>
+              <a:rPr lang="en-US" b="1" dirty="0"/>
+              <a:t>Communication</a:t>
+            </a:r>
+            <a:r>
+              <a:rPr lang="en-US" dirty="0"/>
+              <a:t>: The link between the server and clients, or between devices</a:t>
+            </a:r>
+          </a:p>
+          <a:p>
+            <a:pPr algn="ctr"/>
+            <a:endParaRPr lang="en-GB" dirty="0"/>
+          </a:p>
+        </p:txBody>
+      </p:sp>
+      <p:sp>
+        <p:nvSpPr>
+          <p:cNvPr id="9" name="Rectangle: Rounded Corners 8">
+            <a:extLst>
+              <a:ext uri="{FF2B5EF4-FFF2-40B4-BE49-F238E27FC236}">
+                <a16:creationId xmlns:a16="http://schemas.microsoft.com/office/drawing/2014/main" id="{7272C01C-37DE-1348-C561-998991E0A057}"/>
+              </a:ext>
+            </a:extLst>
+          </p:cNvPr>
+          <p:cNvSpPr/>
+          <p:nvPr/>
+        </p:nvSpPr>
+        <p:spPr>
+          <a:xfrm>
+            <a:off x="9635622" y="2442838"/>
+            <a:ext cx="1864311" cy="612559"/>
+          </a:xfrm>
+          <a:prstGeom prst="roundRect">
+            <a:avLst/>
+          </a:prstGeom>
+          <a:solidFill>
+            <a:schemeClr val="accent2"/>
+          </a:solidFill>
+        </p:spPr>
+        <p:style>
+          <a:lnRef idx="2">
+            <a:schemeClr val="accent1">
+              <a:shade val="15000"/>
+            </a:schemeClr>
+          </a:lnRef>
+          <a:fillRef idx="1">
+            <a:schemeClr val="accent1"/>
+          </a:fillRef>
+          <a:effectRef idx="0">
+            <a:schemeClr val="accent1"/>
+          </a:effectRef>
+          <a:fontRef idx="minor">
+            <a:schemeClr val="lt1"/>
+          </a:fontRef>
+        </p:style>
+        <p:txBody>
+          <a:bodyPr rtlCol="0" anchor="t">
+            <a:normAutofit fontScale="62500" lnSpcReduction="20000"/>
+          </a:bodyPr>
+          <a:lstStyle/>
+          <a:p>
+            <a:pPr algn="ctr"/>
+            <a:r>
+              <a:rPr lang="en-US" b="1" dirty="0"/>
+              <a:t>System</a:t>
+            </a:r>
+            <a:r>
+              <a:rPr lang="en-US" dirty="0"/>
+              <a:t>: The network, when taken as a whole (i.e., sever, clients, etc.)</a:t>
+            </a:r>
+          </a:p>
+          <a:p>
+            <a:pPr algn="ctr"/>
+            <a:endParaRPr lang="en-GB" dirty="0"/>
+          </a:p>
+        </p:txBody>
+      </p:sp>
+      <p:sp>
+        <p:nvSpPr>
+          <p:cNvPr id="17" name="Rectangle: Rounded Corners 16">
+            <a:extLst>
+              <a:ext uri="{FF2B5EF4-FFF2-40B4-BE49-F238E27FC236}">
+                <a16:creationId xmlns:a16="http://schemas.microsoft.com/office/drawing/2014/main" id="{B06ADF4B-E6B9-B728-8701-5A0E35630A0E}"/>
+              </a:ext>
+            </a:extLst>
+          </p:cNvPr>
+          <p:cNvSpPr/>
+          <p:nvPr/>
+        </p:nvSpPr>
+        <p:spPr>
+          <a:xfrm>
+            <a:off x="9635622" y="3083509"/>
+            <a:ext cx="1864311" cy="612559"/>
+          </a:xfrm>
+          <a:prstGeom prst="roundRect">
+            <a:avLst/>
+          </a:prstGeom>
+          <a:solidFill>
+            <a:schemeClr val="accent2"/>
+          </a:solidFill>
+        </p:spPr>
+        <p:style>
+          <a:lnRef idx="2">
+            <a:schemeClr val="accent1">
+              <a:shade val="15000"/>
+            </a:schemeClr>
+          </a:lnRef>
+          <a:fillRef idx="1">
+            <a:schemeClr val="accent1"/>
+          </a:fillRef>
+          <a:effectRef idx="0">
+            <a:schemeClr val="accent1"/>
+          </a:effectRef>
+          <a:fontRef idx="minor">
+            <a:schemeClr val="lt1"/>
+          </a:fontRef>
+        </p:style>
+        <p:txBody>
+          <a:bodyPr rtlCol="0" anchor="t">
+            <a:normAutofit fontScale="62500" lnSpcReduction="20000"/>
+          </a:bodyPr>
+          <a:lstStyle/>
+          <a:p>
+            <a:pPr algn="ctr"/>
+            <a:r>
+              <a:rPr lang="en-US" b="1" dirty="0"/>
+              <a:t>Client</a:t>
+            </a:r>
+            <a:r>
+              <a:rPr lang="en-US" dirty="0"/>
+              <a:t>: The remote device or entity which does the local training</a:t>
+            </a:r>
+            <a:endParaRPr lang="en-GB" dirty="0"/>
+          </a:p>
+        </p:txBody>
+      </p:sp>
+      <p:sp>
+        <p:nvSpPr>
+          <p:cNvPr id="21" name="Rectangle: Rounded Corners 20">
+            <a:extLst>
+              <a:ext uri="{FF2B5EF4-FFF2-40B4-BE49-F238E27FC236}">
+                <a16:creationId xmlns:a16="http://schemas.microsoft.com/office/drawing/2014/main" id="{D4B1CC3E-1A8E-83D7-1F27-8D023C40C893}"/>
+              </a:ext>
+            </a:extLst>
+          </p:cNvPr>
+          <p:cNvSpPr/>
+          <p:nvPr/>
+        </p:nvSpPr>
+        <p:spPr>
+          <a:xfrm>
+            <a:off x="9635622" y="3724180"/>
+            <a:ext cx="1864311" cy="612559"/>
+          </a:xfrm>
+          <a:prstGeom prst="roundRect">
+            <a:avLst/>
+          </a:prstGeom>
+          <a:solidFill>
+            <a:schemeClr val="accent2"/>
+          </a:solidFill>
+        </p:spPr>
+        <p:style>
+          <a:lnRef idx="2">
+            <a:schemeClr val="accent1">
+              <a:shade val="15000"/>
+            </a:schemeClr>
+          </a:lnRef>
+          <a:fillRef idx="1">
+            <a:schemeClr val="accent1"/>
+          </a:fillRef>
+          <a:effectRef idx="0">
+            <a:schemeClr val="accent1"/>
+          </a:effectRef>
+          <a:fontRef idx="minor">
+            <a:schemeClr val="lt1"/>
+          </a:fontRef>
+        </p:style>
+        <p:txBody>
+          <a:bodyPr rtlCol="0" anchor="t">
+            <a:normAutofit fontScale="62500" lnSpcReduction="20000"/>
+          </a:bodyPr>
+          <a:lstStyle/>
+          <a:p>
+            <a:pPr algn="ctr"/>
+            <a:r>
+              <a:rPr lang="en-US" b="1" dirty="0"/>
+              <a:t>Data</a:t>
+            </a:r>
+            <a:r>
+              <a:rPr lang="en-US" dirty="0"/>
+              <a:t>: The data gathered by the client, which is used for local training</a:t>
+            </a:r>
+            <a:endParaRPr lang="en-GB" dirty="0"/>
+          </a:p>
+        </p:txBody>
+      </p:sp>
+      <p:sp>
+        <p:nvSpPr>
+          <p:cNvPr id="24" name="Rectangle: Rounded Corners 23">
+            <a:extLst>
+              <a:ext uri="{FF2B5EF4-FFF2-40B4-BE49-F238E27FC236}">
+                <a16:creationId xmlns:a16="http://schemas.microsoft.com/office/drawing/2014/main" id="{AD92B4A3-9F99-1D85-D674-84A568E4BC7D}"/>
+              </a:ext>
+            </a:extLst>
+          </p:cNvPr>
+          <p:cNvSpPr/>
+          <p:nvPr/>
+        </p:nvSpPr>
+        <p:spPr>
+          <a:xfrm>
+            <a:off x="9635622" y="4364851"/>
+            <a:ext cx="1864311" cy="612559"/>
+          </a:xfrm>
+          <a:prstGeom prst="roundRect">
+            <a:avLst/>
+          </a:prstGeom>
+          <a:solidFill>
+            <a:schemeClr val="accent2"/>
+          </a:solidFill>
+        </p:spPr>
+        <p:style>
+          <a:lnRef idx="2">
+            <a:schemeClr val="accent1">
+              <a:shade val="15000"/>
+            </a:schemeClr>
+          </a:lnRef>
+          <a:fillRef idx="1">
+            <a:schemeClr val="accent1"/>
+          </a:fillRef>
+          <a:effectRef idx="0">
+            <a:schemeClr val="accent1"/>
+          </a:effectRef>
+          <a:fontRef idx="minor">
+            <a:schemeClr val="lt1"/>
+          </a:fontRef>
+        </p:style>
+        <p:txBody>
+          <a:bodyPr rtlCol="0" anchor="t">
+            <a:normAutofit fontScale="62500" lnSpcReduction="20000"/>
+          </a:bodyPr>
+          <a:lstStyle/>
+          <a:p>
+            <a:pPr algn="ctr"/>
+            <a:r>
+              <a:rPr lang="en-US" b="1" dirty="0"/>
+              <a:t>Model</a:t>
+            </a:r>
+            <a:r>
+              <a:rPr lang="en-US" dirty="0"/>
+              <a:t>: The ML model which is run on the various system elements</a:t>
+            </a:r>
+            <a:endParaRPr lang="en-GB" dirty="0"/>
+          </a:p>
+        </p:txBody>
+      </p:sp>
+      <p:sp>
+        <p:nvSpPr>
+          <p:cNvPr id="26" name="Rectangle: Rounded Corners 25">
+            <a:extLst>
+              <a:ext uri="{FF2B5EF4-FFF2-40B4-BE49-F238E27FC236}">
+                <a16:creationId xmlns:a16="http://schemas.microsoft.com/office/drawing/2014/main" id="{432E74EC-8126-D74D-BEB7-A6FF6A6A691F}"/>
+              </a:ext>
+            </a:extLst>
+          </p:cNvPr>
+          <p:cNvSpPr/>
+          <p:nvPr/>
+        </p:nvSpPr>
+        <p:spPr>
+          <a:xfrm>
+            <a:off x="9635622" y="5005522"/>
+            <a:ext cx="1864311" cy="612559"/>
+          </a:xfrm>
+          <a:prstGeom prst="roundRect">
+            <a:avLst/>
+          </a:prstGeom>
+          <a:solidFill>
+            <a:schemeClr val="accent2"/>
+          </a:solidFill>
+        </p:spPr>
+        <p:style>
+          <a:lnRef idx="2">
+            <a:schemeClr val="accent1">
+              <a:shade val="15000"/>
+            </a:schemeClr>
+          </a:lnRef>
+          <a:fillRef idx="1">
+            <a:schemeClr val="accent1"/>
+          </a:fillRef>
+          <a:effectRef idx="0">
+            <a:schemeClr val="accent1"/>
+          </a:effectRef>
+          <a:fontRef idx="minor">
+            <a:schemeClr val="lt1"/>
+          </a:fontRef>
+        </p:style>
+        <p:txBody>
+          <a:bodyPr rtlCol="0" anchor="ctr">
+            <a:normAutofit fontScale="62500" lnSpcReduction="20000"/>
+          </a:bodyPr>
+          <a:lstStyle/>
+          <a:p>
+            <a:pPr algn="ctr"/>
+            <a:r>
+              <a:rPr lang="en-US" b="1" dirty="0"/>
+              <a:t>Privacy</a:t>
+            </a:r>
+            <a:r>
+              <a:rPr lang="en-US" dirty="0"/>
+              <a:t>: The need to keep data safe and secure</a:t>
+            </a:r>
+            <a:endParaRPr lang="en-GB" dirty="0"/>
+          </a:p>
+        </p:txBody>
+      </p:sp>
+    </p:spTree>
+    <p:extLst>
+      <p:ext uri="{BB962C8B-B14F-4D97-AF65-F5344CB8AC3E}">
+        <p14:creationId xmlns:p14="http://schemas.microsoft.com/office/powerpoint/2010/main" val="129023176"/>
+      </p:ext>
+    </p:extLst>
+  </p:cSld>
+  <p:clrMapOvr>
+    <a:masterClrMapping/>
+  </p:clrMapOvr>
+</p:sld>
+</file>
+
+<file path=ppt/slides/slide5.xml><?xml version="1.0" encoding="utf-8"?>
+<p:sld xmlns:a="http://schemas.openxmlformats.org/drawingml/2006/main" xmlns:r="http://schemas.openxmlformats.org/officeDocument/2006/relationships" xmlns:p="http://schemas.openxmlformats.org/presentationml/2006/main">
+  <p:cSld>
+    <p:spTree>
+      <p:nvGrpSpPr>
+        <p:cNvPr id="1" name=""/>
+        <p:cNvGrpSpPr/>
+        <p:nvPr/>
+      </p:nvGrpSpPr>
+      <p:grpSpPr>
+        <a:xfrm>
+          <a:off x="0" y="0"/>
+          <a:ext cx="0" cy="0"/>
+          <a:chOff x="0" y="0"/>
+          <a:chExt cx="0" cy="0"/>
+        </a:xfrm>
+      </p:grpSpPr>
       <p:sp>
         <p:nvSpPr>
           <p:cNvPr id="2" name="Title 1">
@@ -9590,7 +10081,7 @@
           <a:p>
             <a:fld id="{D3726DCB-FEA5-4222-BB45-1CC90DF962E6}" type="slidenum">
               <a:rPr lang="en-GB" smtClean="0"/>
-              <a:t>4</a:t>
+              <a:t>5</a:t>
             </a:fld>
             <a:endParaRPr lang="en-GB"/>
           </a:p>
@@ -9678,7 +10169,7 @@
 </p:sld>
 </file>
 
-<file path=ppt/slides/slide5.xml><?xml version="1.0" encoding="utf-8"?>
+<file path=ppt/slides/slide6.xml><?xml version="1.0" encoding="utf-8"?>
 <p:sld xmlns:a="http://schemas.openxmlformats.org/drawingml/2006/main" xmlns:r="http://schemas.openxmlformats.org/officeDocument/2006/relationships" xmlns:p="http://schemas.openxmlformats.org/presentationml/2006/main">
   <p:cSld>
     <p:spTree>
@@ -9747,7 +10238,7 @@
           <a:p>
             <a:fld id="{D3726DCB-FEA5-4222-BB45-1CC90DF962E6}" type="slidenum">
               <a:rPr lang="en-GB" smtClean="0"/>
-              <a:t>5</a:t>
+              <a:t>6</a:t>
             </a:fld>
             <a:endParaRPr lang="en-GB"/>
           </a:p>
@@ -9835,7 +10326,7 @@
 </p:sld>
 </file>
 
-<file path=ppt/slides/slide6.xml><?xml version="1.0" encoding="utf-8"?>
+<file path=ppt/slides/slide7.xml><?xml version="1.0" encoding="utf-8"?>
 <p:sld xmlns:a="http://schemas.openxmlformats.org/drawingml/2006/main" xmlns:r="http://schemas.openxmlformats.org/officeDocument/2006/relationships" xmlns:p="http://schemas.openxmlformats.org/presentationml/2006/main">
   <p:cSld>
     <p:spTree>
@@ -10002,7 +10493,7 @@
           <a:p>
             <a:fld id="{D3726DCB-FEA5-4222-BB45-1CC90DF962E6}" type="slidenum">
               <a:rPr lang="en-GB" smtClean="0"/>
-              <a:t>6</a:t>
+              <a:t>7</a:t>
             </a:fld>
             <a:endParaRPr lang="en-GB"/>
           </a:p>

</xml_diff>

<commit_message>
Updating slides with removal of items I am not interested in, and organising them
</commit_message>
<xml_diff>
--- a/Presentations/Supervisor Meetings/2024/202404XX.pptx
+++ b/Presentations/Supervisor Meetings/2024/202404XX.pptx
@@ -5,16 +5,15 @@
     <p:sldMasterId id="2147483884" r:id="rId1"/>
   </p:sldMasterIdLst>
   <p:notesMasterIdLst>
-    <p:notesMasterId r:id="rId9"/>
+    <p:notesMasterId r:id="rId8"/>
   </p:notesMasterIdLst>
   <p:sldIdLst>
     <p:sldId id="256" r:id="rId2"/>
     <p:sldId id="257" r:id="rId3"/>
     <p:sldId id="262" r:id="rId4"/>
     <p:sldId id="266" r:id="rId5"/>
-    <p:sldId id="263" r:id="rId6"/>
-    <p:sldId id="264" r:id="rId7"/>
-    <p:sldId id="265" r:id="rId8"/>
+    <p:sldId id="267" r:id="rId6"/>
+    <p:sldId id="265" r:id="rId7"/>
   </p:sldIdLst>
   <p:sldSz cx="12192000" cy="6858000"/>
   <p:notesSz cx="6858000" cy="9144000"/>
@@ -124,7 +123,7 @@
 <file path=ppt/revisionInfo.xml><?xml version="1.0" encoding="utf-8"?>
 <p1510:revInfo xmlns:a="http://schemas.openxmlformats.org/drawingml/2006/main" xmlns:r="http://schemas.openxmlformats.org/officeDocument/2006/relationships" xmlns:p1510="http://schemas.microsoft.com/office/powerpoint/2015/10/main">
   <p1510:revLst>
-    <p1510:client id="{A00DBCA1-E1BD-4C02-BB36-528815D88A8B}" v="8" dt="2024-04-17T15:09:56.997"/>
+    <p1510:client id="{A00DBCA1-E1BD-4C02-BB36-528815D88A8B}" v="49" dt="2024-04-20T17:12:34.666"/>
   </p1510:revLst>
 </p1510:revInfo>
 </file>
@@ -3325,7 +3324,7 @@
   <pc:docChgLst>
     <pc:chgData name="Sean O Fithcheallaigh" userId="47659c31-a575-4792-8be3-61268c4ee0d6" providerId="ADAL" clId="{A00DBCA1-E1BD-4C02-BB36-528815D88A8B}"/>
     <pc:docChg chg="undo custSel addSld delSld modSld">
-      <pc:chgData name="Sean O Fithcheallaigh" userId="47659c31-a575-4792-8be3-61268c4ee0d6" providerId="ADAL" clId="{A00DBCA1-E1BD-4C02-BB36-528815D88A8B}" dt="2024-04-17T15:15:16.346" v="138" actId="27636"/>
+      <pc:chgData name="Sean O Fithcheallaigh" userId="47659c31-a575-4792-8be3-61268c4ee0d6" providerId="ADAL" clId="{A00DBCA1-E1BD-4C02-BB36-528815D88A8B}" dt="2024-04-20T17:12:34.650" v="548" actId="1076"/>
       <pc:docMkLst>
         <pc:docMk/>
       </pc:docMkLst>
@@ -3439,8 +3438,22 @@
           </ac:cxnSpMkLst>
         </pc:cxnChg>
       </pc:sldChg>
+      <pc:sldChg chg="del">
+        <pc:chgData name="Sean O Fithcheallaigh" userId="47659c31-a575-4792-8be3-61268c4ee0d6" providerId="ADAL" clId="{A00DBCA1-E1BD-4C02-BB36-528815D88A8B}" dt="2024-04-20T17:12:14.592" v="546" actId="47"/>
+        <pc:sldMkLst>
+          <pc:docMk/>
+          <pc:sldMk cId="3987306874" sldId="263"/>
+        </pc:sldMkLst>
+      </pc:sldChg>
+      <pc:sldChg chg="del">
+        <pc:chgData name="Sean O Fithcheallaigh" userId="47659c31-a575-4792-8be3-61268c4ee0d6" providerId="ADAL" clId="{A00DBCA1-E1BD-4C02-BB36-528815D88A8B}" dt="2024-04-20T17:12:16.325" v="547" actId="47"/>
+        <pc:sldMkLst>
+          <pc:docMk/>
+          <pc:sldMk cId="2173603187" sldId="264"/>
+        </pc:sldMkLst>
+      </pc:sldChg>
       <pc:sldChg chg="addSp delSp modSp add mod">
-        <pc:chgData name="Sean O Fithcheallaigh" userId="47659c31-a575-4792-8be3-61268c4ee0d6" providerId="ADAL" clId="{A00DBCA1-E1BD-4C02-BB36-528815D88A8B}" dt="2024-04-17T15:15:16.346" v="138" actId="27636"/>
+        <pc:chgData name="Sean O Fithcheallaigh" userId="47659c31-a575-4792-8be3-61268c4ee0d6" providerId="ADAL" clId="{A00DBCA1-E1BD-4C02-BB36-528815D88A8B}" dt="2024-04-20T15:32:20.701" v="160" actId="478"/>
         <pc:sldMkLst>
           <pc:docMk/>
           <pc:sldMk cId="129023176" sldId="266"/>
@@ -3453,12 +3466,20 @@
             <ac:spMk id="3" creationId="{6E0278D4-A37C-DE0F-37CD-F271C3D0E448}"/>
           </ac:spMkLst>
         </pc:spChg>
-        <pc:picChg chg="add mod ord modCrop">
-          <ac:chgData name="Sean O Fithcheallaigh" userId="47659c31-a575-4792-8be3-61268c4ee0d6" providerId="ADAL" clId="{A00DBCA1-E1BD-4C02-BB36-528815D88A8B}" dt="2024-04-17T15:11:35.227" v="99" actId="14100"/>
+        <pc:picChg chg="add del mod ord modCrop">
+          <ac:chgData name="Sean O Fithcheallaigh" userId="47659c31-a575-4792-8be3-61268c4ee0d6" providerId="ADAL" clId="{A00DBCA1-E1BD-4C02-BB36-528815D88A8B}" dt="2024-04-20T15:31:27.180" v="148" actId="478"/>
           <ac:picMkLst>
             <pc:docMk/>
             <pc:sldMk cId="129023176" sldId="266"/>
             <ac:picMk id="4" creationId="{98BF4B6C-A515-D4F3-6FD5-4A4E5C3F1965}"/>
+          </ac:picMkLst>
+        </pc:picChg>
+        <pc:picChg chg="add mod">
+          <ac:chgData name="Sean O Fithcheallaigh" userId="47659c31-a575-4792-8be3-61268c4ee0d6" providerId="ADAL" clId="{A00DBCA1-E1BD-4C02-BB36-528815D88A8B}" dt="2024-04-20T15:32:08.059" v="156" actId="1076"/>
+          <ac:picMkLst>
+            <pc:docMk/>
+            <pc:sldMk cId="129023176" sldId="266"/>
+            <ac:picMk id="15" creationId="{DAAD6835-3577-29D4-DB8D-BC7044B2ABC1}"/>
           </ac:picMkLst>
         </pc:picChg>
         <pc:picChg chg="del">
@@ -3469,12 +3490,28 @@
             <ac:picMk id="28" creationId="{CB2F3A77-3849-DA56-7FB0-BCA1ACFE8801}"/>
           </ac:picMkLst>
         </pc:picChg>
+        <pc:cxnChg chg="add del mod">
+          <ac:chgData name="Sean O Fithcheallaigh" userId="47659c31-a575-4792-8be3-61268c4ee0d6" providerId="ADAL" clId="{A00DBCA1-E1BD-4C02-BB36-528815D88A8B}" dt="2024-04-20T15:32:16.905" v="158" actId="478"/>
+          <ac:cxnSpMkLst>
+            <pc:docMk/>
+            <pc:sldMk cId="129023176" sldId="266"/>
+            <ac:cxnSpMk id="6" creationId="{534F2335-CA43-D5D3-874F-B7A9BD046BC6}"/>
+          </ac:cxnSpMkLst>
+        </pc:cxnChg>
         <pc:cxnChg chg="del mod">
           <ac:chgData name="Sean O Fithcheallaigh" userId="47659c31-a575-4792-8be3-61268c4ee0d6" providerId="ADAL" clId="{A00DBCA1-E1BD-4C02-BB36-528815D88A8B}" dt="2024-04-17T15:11:44.386" v="100" actId="478"/>
           <ac:cxnSpMkLst>
             <pc:docMk/>
             <pc:sldMk cId="129023176" sldId="266"/>
             <ac:cxnSpMk id="6" creationId="{B25F3BD7-3E12-A818-D951-ADEC84351BDA}"/>
+          </ac:cxnSpMkLst>
+        </pc:cxnChg>
+        <pc:cxnChg chg="add del mod">
+          <ac:chgData name="Sean O Fithcheallaigh" userId="47659c31-a575-4792-8be3-61268c4ee0d6" providerId="ADAL" clId="{A00DBCA1-E1BD-4C02-BB36-528815D88A8B}" dt="2024-04-20T15:32:15.699" v="157" actId="478"/>
+          <ac:cxnSpMkLst>
+            <pc:docMk/>
+            <pc:sldMk cId="129023176" sldId="266"/>
+            <ac:cxnSpMk id="8" creationId="{4758D358-B172-FE53-517B-E654F7855685}"/>
           </ac:cxnSpMkLst>
         </pc:cxnChg>
         <pc:cxnChg chg="del">
@@ -3483,6 +3520,22 @@
             <pc:docMk/>
             <pc:sldMk cId="129023176" sldId="266"/>
             <ac:cxnSpMk id="12" creationId="{83EF70D2-40A7-E68A-ED5B-308F1786E83A}"/>
+          </ac:cxnSpMkLst>
+        </pc:cxnChg>
+        <pc:cxnChg chg="add del mod">
+          <ac:chgData name="Sean O Fithcheallaigh" userId="47659c31-a575-4792-8be3-61268c4ee0d6" providerId="ADAL" clId="{A00DBCA1-E1BD-4C02-BB36-528815D88A8B}" dt="2024-04-20T15:32:20.701" v="160" actId="478"/>
+          <ac:cxnSpMkLst>
+            <pc:docMk/>
+            <pc:sldMk cId="129023176" sldId="266"/>
+            <ac:cxnSpMk id="12" creationId="{CA934FFC-AE1E-6ACD-0D5F-69DB6D01231D}"/>
+          </ac:cxnSpMkLst>
+        </pc:cxnChg>
+        <pc:cxnChg chg="add del mod">
+          <ac:chgData name="Sean O Fithcheallaigh" userId="47659c31-a575-4792-8be3-61268c4ee0d6" providerId="ADAL" clId="{A00DBCA1-E1BD-4C02-BB36-528815D88A8B}" dt="2024-04-20T15:32:18.553" v="159" actId="478"/>
+          <ac:cxnSpMkLst>
+            <pc:docMk/>
+            <pc:sldMk cId="129023176" sldId="266"/>
+            <ac:cxnSpMk id="13" creationId="{9BAD3F1B-6045-8282-242F-635B9A747836}"/>
           </ac:cxnSpMkLst>
         </pc:cxnChg>
         <pc:cxnChg chg="del">
@@ -3530,6 +3583,85 @@
             <pc:docMk/>
             <pc:sldMk cId="2365521372" sldId="266"/>
             <ac:picMk id="28" creationId="{CB2F3A77-3849-DA56-7FB0-BCA1ACFE8801}"/>
+          </ac:picMkLst>
+        </pc:picChg>
+      </pc:sldChg>
+      <pc:sldChg chg="addSp delSp modSp new mod">
+        <pc:chgData name="Sean O Fithcheallaigh" userId="47659c31-a575-4792-8be3-61268c4ee0d6" providerId="ADAL" clId="{A00DBCA1-E1BD-4C02-BB36-528815D88A8B}" dt="2024-04-20T17:12:34.650" v="548" actId="1076"/>
+        <pc:sldMkLst>
+          <pc:docMk/>
+          <pc:sldMk cId="3614502453" sldId="267"/>
+        </pc:sldMkLst>
+        <pc:spChg chg="mod">
+          <ac:chgData name="Sean O Fithcheallaigh" userId="47659c31-a575-4792-8be3-61268c4ee0d6" providerId="ADAL" clId="{A00DBCA1-E1BD-4C02-BB36-528815D88A8B}" dt="2024-04-20T16:54:33.736" v="169" actId="20577"/>
+          <ac:spMkLst>
+            <pc:docMk/>
+            <pc:sldMk cId="3614502453" sldId="267"/>
+            <ac:spMk id="2" creationId="{34D60807-593D-B6E4-7AE4-7CF45EBBFEDA}"/>
+          </ac:spMkLst>
+        </pc:spChg>
+        <pc:spChg chg="mod">
+          <ac:chgData name="Sean O Fithcheallaigh" userId="47659c31-a575-4792-8be3-61268c4ee0d6" providerId="ADAL" clId="{A00DBCA1-E1BD-4C02-BB36-528815D88A8B}" dt="2024-04-20T17:00:51.880" v="493" actId="1076"/>
+          <ac:spMkLst>
+            <pc:docMk/>
+            <pc:sldMk cId="3614502453" sldId="267"/>
+            <ac:spMk id="3" creationId="{13A96DD8-307D-473C-C18D-20E27E856752}"/>
+          </ac:spMkLst>
+        </pc:spChg>
+        <pc:spChg chg="add del mod">
+          <ac:chgData name="Sean O Fithcheallaigh" userId="47659c31-a575-4792-8be3-61268c4ee0d6" providerId="ADAL" clId="{A00DBCA1-E1BD-4C02-BB36-528815D88A8B}" dt="2024-04-20T17:08:02.474" v="518" actId="478"/>
+          <ac:spMkLst>
+            <pc:docMk/>
+            <pc:sldMk cId="3614502453" sldId="267"/>
+            <ac:spMk id="5" creationId="{3BBDD9A1-C9E4-8B71-AEEE-4AC46A02E4BD}"/>
+          </ac:spMkLst>
+        </pc:spChg>
+        <pc:spChg chg="add del mod">
+          <ac:chgData name="Sean O Fithcheallaigh" userId="47659c31-a575-4792-8be3-61268c4ee0d6" providerId="ADAL" clId="{A00DBCA1-E1BD-4C02-BB36-528815D88A8B}" dt="2024-04-20T17:08:03.323" v="519" actId="478"/>
+          <ac:spMkLst>
+            <pc:docMk/>
+            <pc:sldMk cId="3614502453" sldId="267"/>
+            <ac:spMk id="6" creationId="{DB7DCE2B-41F9-BE97-C701-339B94F20D4D}"/>
+          </ac:spMkLst>
+        </pc:spChg>
+        <pc:spChg chg="add del mod">
+          <ac:chgData name="Sean O Fithcheallaigh" userId="47659c31-a575-4792-8be3-61268c4ee0d6" providerId="ADAL" clId="{A00DBCA1-E1BD-4C02-BB36-528815D88A8B}" dt="2024-04-20T17:08:04.056" v="520" actId="478"/>
+          <ac:spMkLst>
+            <pc:docMk/>
+            <pc:sldMk cId="3614502453" sldId="267"/>
+            <ac:spMk id="7" creationId="{BE543C21-03E4-9BA0-3C8E-EE01C0BD49AB}"/>
+          </ac:spMkLst>
+        </pc:spChg>
+        <pc:spChg chg="add del mod">
+          <ac:chgData name="Sean O Fithcheallaigh" userId="47659c31-a575-4792-8be3-61268c4ee0d6" providerId="ADAL" clId="{A00DBCA1-E1BD-4C02-BB36-528815D88A8B}" dt="2024-04-20T17:08:00.219" v="517" actId="478"/>
+          <ac:spMkLst>
+            <pc:docMk/>
+            <pc:sldMk cId="3614502453" sldId="267"/>
+            <ac:spMk id="8" creationId="{3C47E519-FDA5-0E97-B465-081A2AFD6025}"/>
+          </ac:spMkLst>
+        </pc:spChg>
+        <pc:picChg chg="add mod">
+          <ac:chgData name="Sean O Fithcheallaigh" userId="47659c31-a575-4792-8be3-61268c4ee0d6" providerId="ADAL" clId="{A00DBCA1-E1BD-4C02-BB36-528815D88A8B}" dt="2024-04-20T17:12:34.650" v="548" actId="1076"/>
+          <ac:picMkLst>
+            <pc:docMk/>
+            <pc:sldMk cId="3614502453" sldId="267"/>
+            <ac:picMk id="1026" creationId="{DE4B107D-E35A-9A62-C4B3-DC0DF3CDE1AF}"/>
+          </ac:picMkLst>
+        </pc:picChg>
+        <pc:picChg chg="add mod">
+          <ac:chgData name="Sean O Fithcheallaigh" userId="47659c31-a575-4792-8be3-61268c4ee0d6" providerId="ADAL" clId="{A00DBCA1-E1BD-4C02-BB36-528815D88A8B}" dt="2024-04-20T17:12:34.650" v="548" actId="1076"/>
+          <ac:picMkLst>
+            <pc:docMk/>
+            <pc:sldMk cId="3614502453" sldId="267"/>
+            <ac:picMk id="1028" creationId="{6F4458BC-D3DE-698C-CF70-4C31B62A3F5B}"/>
+          </ac:picMkLst>
+        </pc:picChg>
+        <pc:picChg chg="add mod">
+          <ac:chgData name="Sean O Fithcheallaigh" userId="47659c31-a575-4792-8be3-61268c4ee0d6" providerId="ADAL" clId="{A00DBCA1-E1BD-4C02-BB36-528815D88A8B}" dt="2024-04-20T17:12:34.650" v="548" actId="1076"/>
+          <ac:picMkLst>
+            <pc:docMk/>
+            <pc:sldMk cId="3614502453" sldId="267"/>
+            <ac:picMk id="1030" creationId="{DADB068D-187E-A8D8-F72D-19BCCB8EF339}"/>
           </ac:picMkLst>
         </pc:picChg>
       </pc:sldChg>
@@ -4246,7 +4378,7 @@
           <a:p>
             <a:fld id="{E9A43392-C767-4137-A1B4-E9A9DDFBDAD0}" type="datetimeFigureOut">
               <a:rPr lang="en-GB" smtClean="0"/>
-              <a:t>17/04/2024</a:t>
+              <a:t>19/04/2024</a:t>
             </a:fld>
             <a:endParaRPr lang="en-GB"/>
           </a:p>
@@ -4742,7 +4874,7 @@
           <a:p>
             <a:fld id="{5B07C734-A788-4C44-A615-CFDCB507568B}" type="datetime1">
               <a:rPr lang="en-GB" smtClean="0"/>
-              <a:t>17/04/2024</a:t>
+              <a:t>19/04/2024</a:t>
             </a:fld>
             <a:endParaRPr lang="en-GB"/>
           </a:p>
@@ -4953,7 +5085,7 @@
           <a:p>
             <a:fld id="{BBCA379E-BDDE-43DA-BA17-E6B54240C0B3}" type="datetime1">
               <a:rPr lang="en-GB" smtClean="0"/>
-              <a:t>17/04/2024</a:t>
+              <a:t>19/04/2024</a:t>
             </a:fld>
             <a:endParaRPr lang="en-GB"/>
           </a:p>
@@ -5214,7 +5346,7 @@
           <a:p>
             <a:fld id="{133DCD2D-99F9-4E1C-9F3B-8D374F39343D}" type="datetime1">
               <a:rPr lang="en-GB" smtClean="0"/>
-              <a:t>17/04/2024</a:t>
+              <a:t>19/04/2024</a:t>
             </a:fld>
             <a:endParaRPr lang="en-GB"/>
           </a:p>
@@ -5403,7 +5535,7 @@
           <a:p>
             <a:fld id="{7778A1CA-0478-45A0-9435-D96032CA4164}" type="datetime1">
               <a:rPr lang="en-GB" smtClean="0"/>
-              <a:t>17/04/2024</a:t>
+              <a:t>19/04/2024</a:t>
             </a:fld>
             <a:endParaRPr lang="en-GB"/>
           </a:p>
@@ -5755,7 +5887,7 @@
           <a:p>
             <a:fld id="{23DC5470-1C1D-4923-B8A8-961DFF721FBD}" type="datetime1">
               <a:rPr lang="en-GB" smtClean="0"/>
-              <a:t>17/04/2024</a:t>
+              <a:t>19/04/2024</a:t>
             </a:fld>
             <a:endParaRPr lang="en-GB"/>
           </a:p>
@@ -6033,7 +6165,7 @@
           <a:p>
             <a:fld id="{0E741BE0-2C8A-4B1C-AFBF-7305842CD248}" type="datetime1">
               <a:rPr lang="en-GB" smtClean="0"/>
-              <a:t>17/04/2024</a:t>
+              <a:t>19/04/2024</a:t>
             </a:fld>
             <a:endParaRPr lang="en-GB"/>
           </a:p>
@@ -6415,7 +6547,7 @@
           <a:p>
             <a:fld id="{3D2519A9-BEC6-4C36-B98F-DA784E00FBFE}" type="datetime1">
               <a:rPr lang="en-GB" smtClean="0"/>
-              <a:t>17/04/2024</a:t>
+              <a:t>19/04/2024</a:t>
             </a:fld>
             <a:endParaRPr lang="en-GB"/>
           </a:p>
@@ -6536,7 +6668,7 @@
           <a:p>
             <a:fld id="{005527DF-4A67-459D-BBB9-9CF200764E01}" type="datetime1">
               <a:rPr lang="en-GB" smtClean="0"/>
-              <a:t>17/04/2024</a:t>
+              <a:t>19/04/2024</a:t>
             </a:fld>
             <a:endParaRPr lang="en-GB"/>
           </a:p>
@@ -6712,7 +6844,7 @@
           <a:p>
             <a:fld id="{AB815DF0-B384-4B57-B949-BD773032C594}" type="datetime1">
               <a:rPr lang="en-GB" smtClean="0"/>
-              <a:t>17/04/2024</a:t>
+              <a:t>19/04/2024</a:t>
             </a:fld>
             <a:endParaRPr lang="en-GB"/>
           </a:p>
@@ -7071,7 +7203,7 @@
           <a:p>
             <a:fld id="{9A7FC2E2-2BAF-4FF7-AB60-CB61E8F4481E}" type="datetime1">
               <a:rPr lang="en-GB" smtClean="0"/>
-              <a:t>17/04/2024</a:t>
+              <a:t>19/04/2024</a:t>
             </a:fld>
             <a:endParaRPr lang="en-GB"/>
           </a:p>
@@ -7453,7 +7585,7 @@
           <a:p>
             <a:fld id="{922F4F2B-4496-4E96-BB72-FCD2DDED5FAC}" type="datetime1">
               <a:rPr lang="en-GB" smtClean="0"/>
-              <a:t>17/04/2024</a:t>
+              <a:t>19/04/2024</a:t>
             </a:fld>
             <a:endParaRPr lang="en-GB"/>
           </a:p>
@@ -7748,7 +7880,7 @@
           <a:p>
             <a:fld id="{A27F2E53-74FD-4822-A803-F8740BFB7820}" type="datetime1">
               <a:rPr lang="en-GB" smtClean="0"/>
-              <a:t>17/04/2024</a:t>
+              <a:t>19/04/2024</a:t>
             </a:fld>
             <a:endParaRPr lang="en-GB"/>
           </a:p>
@@ -9515,41 +9647,6 @@
           <a:chExt cx="0" cy="0"/>
         </a:xfrm>
       </p:grpSpPr>
-      <p:pic>
-        <p:nvPicPr>
-          <p:cNvPr id="4" name="Picture 3" descr="A screenshot of a computer&#10;&#10;Description automatically generated">
-            <a:extLst>
-              <a:ext uri="{FF2B5EF4-FFF2-40B4-BE49-F238E27FC236}">
-                <a16:creationId xmlns:a16="http://schemas.microsoft.com/office/drawing/2014/main" id="{98BF4B6C-A515-D4F3-6FD5-4A4E5C3F1965}"/>
-              </a:ext>
-            </a:extLst>
-          </p:cNvPr>
-          <p:cNvPicPr>
-            <a:picLocks noChangeAspect="1"/>
-          </p:cNvPicPr>
-          <p:nvPr/>
-        </p:nvPicPr>
-        <p:blipFill rotWithShape="1">
-          <a:blip r:embed="rId2">
-            <a:extLst>
-              <a:ext uri="{28A0092B-C50C-407E-A947-70E740481C1C}">
-                <a14:useLocalDpi xmlns:a14="http://schemas.microsoft.com/office/drawing/2010/main" val="0"/>
-              </a:ext>
-            </a:extLst>
-          </a:blip>
-          <a:srcRect l="476" t="2304" r="1726"/>
-          <a:stretch/>
-        </p:blipFill>
-        <p:spPr>
-          <a:xfrm>
-            <a:off x="471145" y="1433866"/>
-            <a:ext cx="8930307" cy="4109683"/>
-          </a:xfrm>
-          <a:prstGeom prst="rect">
-            <a:avLst/>
-          </a:prstGeom>
-        </p:spPr>
-      </p:pic>
       <p:sp>
         <p:nvSpPr>
           <p:cNvPr id="3" name="Title 1">
@@ -9997,6 +10094,42 @@
           </a:p>
         </p:txBody>
       </p:sp>
+      <p:pic>
+        <p:nvPicPr>
+          <p:cNvPr id="15" name="Picture 14" descr="A chart with text and orange squares&#10;&#10;Description automatically generated with medium confidence">
+            <a:extLst>
+              <a:ext uri="{FF2B5EF4-FFF2-40B4-BE49-F238E27FC236}">
+                <a16:creationId xmlns:a16="http://schemas.microsoft.com/office/drawing/2014/main" id="{DAAD6835-3577-29D4-DB8D-BC7044B2ABC1}"/>
+              </a:ext>
+            </a:extLst>
+          </p:cNvPr>
+          <p:cNvPicPr>
+            <a:picLocks noChangeAspect="1"/>
+          </p:cNvPicPr>
+          <p:nvPr/>
+        </p:nvPicPr>
+        <p:blipFill>
+          <a:blip r:embed="rId2">
+            <a:extLst>
+              <a:ext uri="{28A0092B-C50C-407E-A947-70E740481C1C}">
+                <a14:useLocalDpi xmlns:a14="http://schemas.microsoft.com/office/drawing/2010/main" val="0"/>
+              </a:ext>
+            </a:extLst>
+          </a:blip>
+          <a:stretch>
+            <a:fillRect/>
+          </a:stretch>
+        </p:blipFill>
+        <p:spPr>
+          <a:xfrm>
+            <a:off x="472205" y="1388576"/>
+            <a:ext cx="9019700" cy="4080847"/>
+          </a:xfrm>
+          <a:prstGeom prst="rect">
+            <a:avLst/>
+          </a:prstGeom>
+        </p:spPr>
+      </p:pic>
     </p:spTree>
     <p:extLst>
       <p:ext uri="{BB962C8B-B14F-4D97-AF65-F5344CB8AC3E}">
@@ -10032,7 +10165,7 @@
           <p:cNvPr id="2" name="Title 1">
             <a:extLst>
               <a:ext uri="{FF2B5EF4-FFF2-40B4-BE49-F238E27FC236}">
-                <a16:creationId xmlns:a16="http://schemas.microsoft.com/office/drawing/2014/main" id="{F37D474F-0075-3404-D887-30844DB371EA}"/>
+                <a16:creationId xmlns:a16="http://schemas.microsoft.com/office/drawing/2014/main" id="{34D60807-593D-B6E4-7AE4-7CF45EBBFEDA}"/>
               </a:ext>
             </a:extLst>
           </p:cNvPr>
@@ -10045,14 +10178,44 @@
         </p:nvSpPr>
         <p:spPr/>
         <p:txBody>
-          <a:bodyPr>
-            <a:normAutofit/>
-          </a:bodyPr>
+          <a:bodyPr/>
           <a:lstStyle/>
           <a:p>
             <a:r>
               <a:rPr lang="en-US" dirty="0"/>
-              <a:t>Exploring Challenges in FL</a:t>
+              <a:t>Grouping</a:t>
+            </a:r>
+            <a:endParaRPr lang="en-GB" dirty="0"/>
+          </a:p>
+        </p:txBody>
+      </p:sp>
+      <p:sp>
+        <p:nvSpPr>
+          <p:cNvPr id="3" name="Content Placeholder 2">
+            <a:extLst>
+              <a:ext uri="{FF2B5EF4-FFF2-40B4-BE49-F238E27FC236}">
+                <a16:creationId xmlns:a16="http://schemas.microsoft.com/office/drawing/2014/main" id="{13A96DD8-307D-473C-C18D-20E27E856752}"/>
+              </a:ext>
+            </a:extLst>
+          </p:cNvPr>
+          <p:cNvSpPr>
+            <a:spLocks noGrp="1"/>
+          </p:cNvSpPr>
+          <p:nvPr>
+            <p:ph idx="1"/>
+          </p:nvPr>
+        </p:nvSpPr>
+        <p:spPr/>
+        <p:txBody>
+          <a:bodyPr/>
+          <a:lstStyle/>
+          <a:p>
+            <a:pPr marL="0" indent="0">
+              <a:buNone/>
+            </a:pPr>
+            <a:r>
+              <a:rPr lang="en-US" dirty="0"/>
+              <a:t>The challenges identified seem like they could be related, and as such can be grouped together  </a:t>
             </a:r>
             <a:endParaRPr lang="en-GB" dirty="0"/>
           </a:p>
@@ -10063,7 +10226,7 @@
           <p:cNvPr id="4" name="Slide Number Placeholder 3">
             <a:extLst>
               <a:ext uri="{FF2B5EF4-FFF2-40B4-BE49-F238E27FC236}">
-                <a16:creationId xmlns:a16="http://schemas.microsoft.com/office/drawing/2014/main" id="{12A72BC9-4696-BBBE-8F17-7D4E77759225}"/>
+                <a16:creationId xmlns:a16="http://schemas.microsoft.com/office/drawing/2014/main" id="{74C17E6D-2CC1-4BC8-7340-A59AA673324F}"/>
               </a:ext>
             </a:extLst>
           </p:cNvPr>
@@ -10087,79 +10250,149 @@
           </a:p>
         </p:txBody>
       </p:sp>
-      <p:graphicFrame>
-        <p:nvGraphicFramePr>
-          <p:cNvPr id="23" name="Object 22">
+      <p:pic>
+        <p:nvPicPr>
+          <p:cNvPr id="1026" name="Picture 2">
             <a:extLst>
               <a:ext uri="{FF2B5EF4-FFF2-40B4-BE49-F238E27FC236}">
-                <a16:creationId xmlns:a16="http://schemas.microsoft.com/office/drawing/2014/main" id="{E5789AB4-5D9B-DE23-92E7-1FCBE18AAF1C}"/>
+                <a16:creationId xmlns:a16="http://schemas.microsoft.com/office/drawing/2014/main" id="{DE4B107D-E35A-9A62-C4B3-DC0DF3CDE1AF}"/>
               </a:ext>
             </a:extLst>
           </p:cNvPr>
-          <p:cNvGraphicFramePr>
-            <a:graphicFrameLocks noChangeAspect="1"/>
-          </p:cNvGraphicFramePr>
-          <p:nvPr>
-            <p:extLst>
-              <p:ext uri="{D42A27DB-BD31-4B8C-83A1-F6EECF244321}">
-                <p14:modId xmlns:p14="http://schemas.microsoft.com/office/powerpoint/2010/main" val="3030645710"/>
-              </p:ext>
-            </p:extLst>
-          </p:nvPr>
-        </p:nvGraphicFramePr>
-        <p:xfrm>
-          <a:off x="939800" y="1304787"/>
-          <a:ext cx="10312400" cy="4678763"/>
-        </p:xfrm>
-        <a:graphic>
-          <a:graphicData uri="http://schemas.openxmlformats.org/presentationml/2006/ole">
-            <mc:AlternateContent xmlns:mc="http://schemas.openxmlformats.org/markup-compatibility/2006">
-              <mc:Choice xmlns:v="urn:schemas-microsoft-com:vml" Requires="v">
-                <p:oleObj name="Worksheet" r:id="rId2" imgW="12367186" imgH="5874888" progId="Excel.Sheet.12">
-                  <p:embed/>
-                </p:oleObj>
-              </mc:Choice>
-              <mc:Fallback>
-                <p:oleObj name="Worksheet" r:id="rId2" imgW="12367186" imgH="5874888" progId="Excel.Sheet.12">
-                  <p:embed/>
-                  <p:pic>
-                    <p:nvPicPr>
-                      <p:cNvPr id="23" name="Object 22">
-                        <a:extLst>
-                          <a:ext uri="{FF2B5EF4-FFF2-40B4-BE49-F238E27FC236}">
-                            <a16:creationId xmlns:a16="http://schemas.microsoft.com/office/drawing/2014/main" id="{E5789AB4-5D9B-DE23-92E7-1FCBE18AAF1C}"/>
-                          </a:ext>
-                        </a:extLst>
-                      </p:cNvPr>
-                      <p:cNvPicPr/>
-                      <p:nvPr/>
-                    </p:nvPicPr>
-                    <p:blipFill>
-                      <a:blip r:embed="rId3"/>
-                      <a:stretch>
-                        <a:fillRect/>
-                      </a:stretch>
-                    </p:blipFill>
-                    <p:spPr>
-                      <a:xfrm>
-                        <a:off x="939800" y="1304787"/>
-                        <a:ext cx="10312400" cy="4678763"/>
-                      </a:xfrm>
-                      <a:prstGeom prst="rect">
-                        <a:avLst/>
-                      </a:prstGeom>
-                    </p:spPr>
-                  </p:pic>
-                </p:oleObj>
-              </mc:Fallback>
-            </mc:AlternateContent>
-          </a:graphicData>
-        </a:graphic>
-      </p:graphicFrame>
+          <p:cNvPicPr>
+            <a:picLocks noChangeAspect="1" noChangeArrowheads="1"/>
+          </p:cNvPicPr>
+          <p:nvPr/>
+        </p:nvPicPr>
+        <p:blipFill>
+          <a:blip r:embed="rId2">
+            <a:extLst>
+              <a:ext uri="{28A0092B-C50C-407E-A947-70E740481C1C}">
+                <a14:useLocalDpi xmlns:a14="http://schemas.microsoft.com/office/drawing/2010/main" val="0"/>
+              </a:ext>
+            </a:extLst>
+          </a:blip>
+          <a:srcRect/>
+          <a:stretch>
+            <a:fillRect/>
+          </a:stretch>
+        </p:blipFill>
+        <p:spPr bwMode="auto">
+          <a:xfrm>
+            <a:off x="834629" y="2330791"/>
+            <a:ext cx="3593666" cy="2066945"/>
+          </a:xfrm>
+          <a:prstGeom prst="rect">
+            <a:avLst/>
+          </a:prstGeom>
+          <a:noFill/>
+          <a:extLst>
+            <a:ext uri="{909E8E84-426E-40DD-AFC4-6F175D3DCCD1}">
+              <a14:hiddenFill xmlns:a14="http://schemas.microsoft.com/office/drawing/2010/main">
+                <a:solidFill>
+                  <a:srgbClr val="FFFFFF"/>
+                </a:solidFill>
+              </a14:hiddenFill>
+            </a:ext>
+          </a:extLst>
+        </p:spPr>
+      </p:pic>
+      <p:pic>
+        <p:nvPicPr>
+          <p:cNvPr id="1028" name="Picture 4">
+            <a:extLst>
+              <a:ext uri="{FF2B5EF4-FFF2-40B4-BE49-F238E27FC236}">
+                <a16:creationId xmlns:a16="http://schemas.microsoft.com/office/drawing/2014/main" id="{6F4458BC-D3DE-698C-CF70-4C31B62A3F5B}"/>
+              </a:ext>
+            </a:extLst>
+          </p:cNvPr>
+          <p:cNvPicPr>
+            <a:picLocks noChangeAspect="1" noChangeArrowheads="1"/>
+          </p:cNvPicPr>
+          <p:nvPr/>
+        </p:nvPicPr>
+        <p:blipFill>
+          <a:blip r:embed="rId3">
+            <a:extLst>
+              <a:ext uri="{28A0092B-C50C-407E-A947-70E740481C1C}">
+                <a14:useLocalDpi xmlns:a14="http://schemas.microsoft.com/office/drawing/2010/main" val="0"/>
+              </a:ext>
+            </a:extLst>
+          </a:blip>
+          <a:srcRect/>
+          <a:stretch>
+            <a:fillRect/>
+          </a:stretch>
+        </p:blipFill>
+        <p:spPr bwMode="auto">
+          <a:xfrm>
+            <a:off x="4321615" y="2587007"/>
+            <a:ext cx="3716262" cy="1554515"/>
+          </a:xfrm>
+          <a:prstGeom prst="rect">
+            <a:avLst/>
+          </a:prstGeom>
+          <a:noFill/>
+          <a:extLst>
+            <a:ext uri="{909E8E84-426E-40DD-AFC4-6F175D3DCCD1}">
+              <a14:hiddenFill xmlns:a14="http://schemas.microsoft.com/office/drawing/2010/main">
+                <a:solidFill>
+                  <a:srgbClr val="FFFFFF"/>
+                </a:solidFill>
+              </a14:hiddenFill>
+            </a:ext>
+          </a:extLst>
+        </p:spPr>
+      </p:pic>
+      <p:pic>
+        <p:nvPicPr>
+          <p:cNvPr id="1030" name="Picture 6">
+            <a:extLst>
+              <a:ext uri="{FF2B5EF4-FFF2-40B4-BE49-F238E27FC236}">
+                <a16:creationId xmlns:a16="http://schemas.microsoft.com/office/drawing/2014/main" id="{DADB068D-187E-A8D8-F72D-19BCCB8EF339}"/>
+              </a:ext>
+            </a:extLst>
+          </p:cNvPr>
+          <p:cNvPicPr>
+            <a:picLocks noChangeAspect="1" noChangeArrowheads="1"/>
+          </p:cNvPicPr>
+          <p:nvPr/>
+        </p:nvPicPr>
+        <p:blipFill rotWithShape="1">
+          <a:blip r:embed="rId4">
+            <a:extLst>
+              <a:ext uri="{28A0092B-C50C-407E-A947-70E740481C1C}">
+                <a14:useLocalDpi xmlns:a14="http://schemas.microsoft.com/office/drawing/2010/main" val="0"/>
+              </a:ext>
+            </a:extLst>
+          </a:blip>
+          <a:srcRect l="11836" t="18768" r="12493" b="17168"/>
+          <a:stretch/>
+        </p:blipFill>
+        <p:spPr bwMode="auto">
+          <a:xfrm>
+            <a:off x="8548738" y="3085449"/>
+            <a:ext cx="1584960" cy="641238"/>
+          </a:xfrm>
+          <a:prstGeom prst="rect">
+            <a:avLst/>
+          </a:prstGeom>
+          <a:noFill/>
+          <a:extLst>
+            <a:ext uri="{909E8E84-426E-40DD-AFC4-6F175D3DCCD1}">
+              <a14:hiddenFill xmlns:a14="http://schemas.microsoft.com/office/drawing/2010/main">
+                <a:solidFill>
+                  <a:srgbClr val="FFFFFF"/>
+                </a:solidFill>
+              </a14:hiddenFill>
+            </a:ext>
+          </a:extLst>
+        </p:spPr>
+      </p:pic>
     </p:spTree>
     <p:extLst>
       <p:ext uri="{BB962C8B-B14F-4D97-AF65-F5344CB8AC3E}">
-        <p14:creationId xmlns:p14="http://schemas.microsoft.com/office/powerpoint/2010/main" val="3987306874"/>
+        <p14:creationId xmlns:p14="http://schemas.microsoft.com/office/powerpoint/2010/main" val="3614502453"/>
       </p:ext>
     </p:extLst>
   </p:cSld>
@@ -10191,163 +10424,6 @@
           <p:cNvPr id="2" name="Title 1">
             <a:extLst>
               <a:ext uri="{FF2B5EF4-FFF2-40B4-BE49-F238E27FC236}">
-                <a16:creationId xmlns:a16="http://schemas.microsoft.com/office/drawing/2014/main" id="{68BBD2B2-6CB7-E61E-AEFE-5E35F2D69469}"/>
-              </a:ext>
-            </a:extLst>
-          </p:cNvPr>
-          <p:cNvSpPr>
-            <a:spLocks noGrp="1"/>
-          </p:cNvSpPr>
-          <p:nvPr>
-            <p:ph type="title"/>
-          </p:nvPr>
-        </p:nvSpPr>
-        <p:spPr/>
-        <p:txBody>
-          <a:bodyPr/>
-          <a:lstStyle/>
-          <a:p>
-            <a:r>
-              <a:rPr lang="en-US" dirty="0"/>
-              <a:t>Exploring Challenges in FL</a:t>
-            </a:r>
-            <a:endParaRPr lang="en-GB" dirty="0"/>
-          </a:p>
-        </p:txBody>
-      </p:sp>
-      <p:sp>
-        <p:nvSpPr>
-          <p:cNvPr id="4" name="Slide Number Placeholder 3">
-            <a:extLst>
-              <a:ext uri="{FF2B5EF4-FFF2-40B4-BE49-F238E27FC236}">
-                <a16:creationId xmlns:a16="http://schemas.microsoft.com/office/drawing/2014/main" id="{205BA338-F6AE-BFF7-9FB6-6846B18E1D56}"/>
-              </a:ext>
-            </a:extLst>
-          </p:cNvPr>
-          <p:cNvSpPr>
-            <a:spLocks noGrp="1"/>
-          </p:cNvSpPr>
-          <p:nvPr>
-            <p:ph type="sldNum" sz="quarter" idx="12"/>
-          </p:nvPr>
-        </p:nvSpPr>
-        <p:spPr/>
-        <p:txBody>
-          <a:bodyPr/>
-          <a:lstStyle/>
-          <a:p>
-            <a:fld id="{D3726DCB-FEA5-4222-BB45-1CC90DF962E6}" type="slidenum">
-              <a:rPr lang="en-GB" smtClean="0"/>
-              <a:t>6</a:t>
-            </a:fld>
-            <a:endParaRPr lang="en-GB"/>
-          </a:p>
-        </p:txBody>
-      </p:sp>
-      <p:graphicFrame>
-        <p:nvGraphicFramePr>
-          <p:cNvPr id="6" name="Object 5">
-            <a:extLst>
-              <a:ext uri="{FF2B5EF4-FFF2-40B4-BE49-F238E27FC236}">
-                <a16:creationId xmlns:a16="http://schemas.microsoft.com/office/drawing/2014/main" id="{98530067-7B4E-59CC-E074-93BC6BB9AC13}"/>
-              </a:ext>
-            </a:extLst>
-          </p:cNvPr>
-          <p:cNvGraphicFramePr>
-            <a:graphicFrameLocks noChangeAspect="1"/>
-          </p:cNvGraphicFramePr>
-          <p:nvPr>
-            <p:extLst>
-              <p:ext uri="{D42A27DB-BD31-4B8C-83A1-F6EECF244321}">
-                <p14:modId xmlns:p14="http://schemas.microsoft.com/office/powerpoint/2010/main" val="252234206"/>
-              </p:ext>
-            </p:extLst>
-          </p:nvPr>
-        </p:nvGraphicFramePr>
-        <p:xfrm>
-          <a:off x="939800" y="1332899"/>
-          <a:ext cx="10312400" cy="4686161"/>
-        </p:xfrm>
-        <a:graphic>
-          <a:graphicData uri="http://schemas.openxmlformats.org/presentationml/2006/ole">
-            <mc:AlternateContent xmlns:mc="http://schemas.openxmlformats.org/markup-compatibility/2006">
-              <mc:Choice xmlns:v="urn:schemas-microsoft-com:vml" Requires="v">
-                <p:oleObj name="Worksheet" r:id="rId2" imgW="12367186" imgH="5509075" progId="Excel.Sheet.12">
-                  <p:embed/>
-                </p:oleObj>
-              </mc:Choice>
-              <mc:Fallback>
-                <p:oleObj name="Worksheet" r:id="rId2" imgW="12367186" imgH="5509075" progId="Excel.Sheet.12">
-                  <p:embed/>
-                  <p:pic>
-                    <p:nvPicPr>
-                      <p:cNvPr id="6" name="Object 5">
-                        <a:extLst>
-                          <a:ext uri="{FF2B5EF4-FFF2-40B4-BE49-F238E27FC236}">
-                            <a16:creationId xmlns:a16="http://schemas.microsoft.com/office/drawing/2014/main" id="{98530067-7B4E-59CC-E074-93BC6BB9AC13}"/>
-                          </a:ext>
-                        </a:extLst>
-                      </p:cNvPr>
-                      <p:cNvPicPr/>
-                      <p:nvPr/>
-                    </p:nvPicPr>
-                    <p:blipFill>
-                      <a:blip r:embed="rId3"/>
-                      <a:stretch>
-                        <a:fillRect/>
-                      </a:stretch>
-                    </p:blipFill>
-                    <p:spPr>
-                      <a:xfrm>
-                        <a:off x="939800" y="1332899"/>
-                        <a:ext cx="10312400" cy="4686161"/>
-                      </a:xfrm>
-                      <a:prstGeom prst="rect">
-                        <a:avLst/>
-                      </a:prstGeom>
-                    </p:spPr>
-                  </p:pic>
-                </p:oleObj>
-              </mc:Fallback>
-            </mc:AlternateContent>
-          </a:graphicData>
-        </a:graphic>
-      </p:graphicFrame>
-    </p:spTree>
-    <p:extLst>
-      <p:ext uri="{BB962C8B-B14F-4D97-AF65-F5344CB8AC3E}">
-        <p14:creationId xmlns:p14="http://schemas.microsoft.com/office/powerpoint/2010/main" val="2173603187"/>
-      </p:ext>
-    </p:extLst>
-  </p:cSld>
-  <p:clrMapOvr>
-    <a:masterClrMapping/>
-  </p:clrMapOvr>
-</p:sld>
-</file>
-
-<file path=ppt/slides/slide7.xml><?xml version="1.0" encoding="utf-8"?>
-<p:sld xmlns:a="http://schemas.openxmlformats.org/drawingml/2006/main" xmlns:r="http://schemas.openxmlformats.org/officeDocument/2006/relationships" xmlns:p="http://schemas.openxmlformats.org/presentationml/2006/main">
-  <p:cSld>
-    <p:spTree>
-      <p:nvGrpSpPr>
-        <p:cNvPr id="1" name=""/>
-        <p:cNvGrpSpPr/>
-        <p:nvPr/>
-      </p:nvGrpSpPr>
-      <p:grpSpPr>
-        <a:xfrm>
-          <a:off x="0" y="0"/>
-          <a:ext cx="0" cy="0"/>
-          <a:chOff x="0" y="0"/>
-          <a:chExt cx="0" cy="0"/>
-        </a:xfrm>
-      </p:grpSpPr>
-      <p:sp>
-        <p:nvSpPr>
-          <p:cNvPr id="2" name="Title 1">
-            <a:extLst>
-              <a:ext uri="{FF2B5EF4-FFF2-40B4-BE49-F238E27FC236}">
                 <a16:creationId xmlns:a16="http://schemas.microsoft.com/office/drawing/2014/main" id="{2A405D5C-7D9D-9E86-48C1-BD4C56464E8E}"/>
               </a:ext>
             </a:extLst>
@@ -10493,7 +10569,7 @@
           <a:p>
             <a:fld id="{D3726DCB-FEA5-4222-BB45-1CC90DF962E6}" type="slidenum">
               <a:rPr lang="en-GB" smtClean="0"/>
-              <a:t>7</a:t>
+              <a:t>6</a:t>
             </a:fld>
             <a:endParaRPr lang="en-GB"/>
           </a:p>

</xml_diff>